<commit_message>
bias through variance done in linear regression lecture, on to MLR
</commit_message>
<xml_diff>
--- a/dsmcer_2023_update/Lecture_Notebooks/L4-6_visual_support.pptx
+++ b/dsmcer_2023_update/Lecture_Notebooks/L4-6_visual_support.pptx
@@ -15,14 +15,17 @@
     <p:sldId id="263" r:id="rId9"/>
     <p:sldId id="264" r:id="rId10"/>
     <p:sldId id="265" r:id="rId11"/>
-    <p:sldId id="267" r:id="rId12"/>
-    <p:sldId id="268" r:id="rId13"/>
-    <p:sldId id="269" r:id="rId14"/>
-    <p:sldId id="270" r:id="rId15"/>
-    <p:sldId id="271" r:id="rId16"/>
-    <p:sldId id="272" r:id="rId17"/>
-    <p:sldId id="273" r:id="rId18"/>
-    <p:sldId id="274" r:id="rId19"/>
+    <p:sldId id="275" r:id="rId12"/>
+    <p:sldId id="267" r:id="rId13"/>
+    <p:sldId id="268" r:id="rId14"/>
+    <p:sldId id="269" r:id="rId15"/>
+    <p:sldId id="270" r:id="rId16"/>
+    <p:sldId id="271" r:id="rId17"/>
+    <p:sldId id="272" r:id="rId18"/>
+    <p:sldId id="273" r:id="rId19"/>
+    <p:sldId id="274" r:id="rId20"/>
+    <p:sldId id="276" r:id="rId21"/>
+    <p:sldId id="277" r:id="rId22"/>
   </p:sldIdLst>
   <p:sldSz cx="12192000" cy="6858000"/>
   <p:notesSz cx="6858000" cy="9144000"/>
@@ -4259,84 +4262,658 @@
           <a:chExt cx="0" cy="0"/>
         </a:xfrm>
       </p:grpSpPr>
-      <p:pic>
-        <p:nvPicPr>
-          <p:cNvPr id="4" name="Picture 3">
-            <a:extLst>
-              <a:ext uri="{FF2B5EF4-FFF2-40B4-BE49-F238E27FC236}">
-                <a16:creationId xmlns:a16="http://schemas.microsoft.com/office/drawing/2014/main" id="{49C11C3B-7523-BA4F-97A3-750677216B42}"/>
-              </a:ext>
-            </a:extLst>
-          </p:cNvPr>
-          <p:cNvPicPr>
-            <a:picLocks noChangeAspect="1"/>
-          </p:cNvPicPr>
-          <p:nvPr/>
-        </p:nvPicPr>
-        <p:blipFill>
-          <a:blip r:embed="rId2"/>
-          <a:stretch>
-            <a:fillRect/>
-          </a:stretch>
-        </p:blipFill>
-        <p:spPr>
-          <a:xfrm>
-            <a:off x="-785812" y="2060870"/>
-            <a:ext cx="11536419" cy="2736257"/>
-          </a:xfrm>
-          <a:prstGeom prst="rect">
-            <a:avLst/>
-          </a:prstGeom>
-        </p:spPr>
-      </p:pic>
-      <p:cxnSp>
-        <p:nvCxnSpPr>
-          <p:cNvPr id="6" name="Straight Arrow Connector 5">
-            <a:extLst>
-              <a:ext uri="{FF2B5EF4-FFF2-40B4-BE49-F238E27FC236}">
-                <a16:creationId xmlns:a16="http://schemas.microsoft.com/office/drawing/2014/main" id="{4B355336-D1BC-81D2-8482-D97591D537AD}"/>
-              </a:ext>
-            </a:extLst>
-          </p:cNvPr>
-          <p:cNvCxnSpPr/>
-          <p:nvPr/>
-        </p:nvCxnSpPr>
-        <p:spPr>
-          <a:xfrm flipH="1">
-            <a:off x="5630989" y="2316479"/>
-            <a:ext cx="1389888" cy="243840"/>
-          </a:xfrm>
-          <a:prstGeom prst="straightConnector1">
-            <a:avLst/>
-          </a:prstGeom>
-          <a:ln w="31750">
-            <a:solidFill>
+      <p:grpSp>
+        <p:nvGrpSpPr>
+          <p:cNvPr id="8" name="Group 7">
+            <a:extLst>
+              <a:ext uri="{FF2B5EF4-FFF2-40B4-BE49-F238E27FC236}">
+                <a16:creationId xmlns:a16="http://schemas.microsoft.com/office/drawing/2014/main" id="{87C12AEC-32A9-1A9C-EC35-B63FB72BC60F}"/>
+              </a:ext>
+            </a:extLst>
+          </p:cNvPr>
+          <p:cNvGrpSpPr/>
+          <p:nvPr/>
+        </p:nvGrpSpPr>
+        <p:grpSpPr>
+          <a:xfrm>
+            <a:off x="4325961" y="1044109"/>
+            <a:ext cx="3540078" cy="2012646"/>
+            <a:chOff x="792886" y="1097893"/>
+            <a:chExt cx="3540078" cy="2012646"/>
+          </a:xfrm>
+        </p:grpSpPr>
+        <p:sp>
+          <p:nvSpPr>
+            <p:cNvPr id="4" name="TextBox 3">
+              <a:extLst>
+                <a:ext uri="{FF2B5EF4-FFF2-40B4-BE49-F238E27FC236}">
+                  <a16:creationId xmlns:a16="http://schemas.microsoft.com/office/drawing/2014/main" id="{1102AA27-65F7-E3EE-DB69-CEDECF8EC7A6}"/>
+                </a:ext>
+              </a:extLst>
+            </p:cNvPr>
+            <p:cNvSpPr txBox="1"/>
+            <p:nvPr/>
+          </p:nvSpPr>
+          <p:spPr>
+            <a:xfrm>
+              <a:off x="1018807" y="2741207"/>
+              <a:ext cx="317716" cy="369332"/>
+            </a:xfrm>
+            <a:prstGeom prst="rect">
+              <a:avLst/>
+            </a:prstGeom>
+            <a:noFill/>
+          </p:spPr>
+          <p:txBody>
+            <a:bodyPr wrap="none" rtlCol="0">
+              <a:spAutoFit/>
+            </a:bodyPr>
+            <a:lstStyle/>
+            <a:p>
+              <a:r>
+                <a:rPr lang="en-US" dirty="0"/>
+                <a:t>A</a:t>
+              </a:r>
+            </a:p>
+          </p:txBody>
+        </p:sp>
+        <p:sp>
+          <p:nvSpPr>
+            <p:cNvPr id="5" name="TextBox 4">
+              <a:extLst>
+                <a:ext uri="{FF2B5EF4-FFF2-40B4-BE49-F238E27FC236}">
+                  <a16:creationId xmlns:a16="http://schemas.microsoft.com/office/drawing/2014/main" id="{A668694D-DBD7-C090-10F2-24270DE322CD}"/>
+                </a:ext>
+              </a:extLst>
+            </p:cNvPr>
+            <p:cNvSpPr txBox="1"/>
+            <p:nvPr/>
+          </p:nvSpPr>
+          <p:spPr>
+            <a:xfrm>
+              <a:off x="4023264" y="2741207"/>
+              <a:ext cx="309700" cy="369332"/>
+            </a:xfrm>
+            <a:prstGeom prst="rect">
+              <a:avLst/>
+            </a:prstGeom>
+            <a:noFill/>
+          </p:spPr>
+          <p:txBody>
+            <a:bodyPr wrap="none" rtlCol="0">
+              <a:spAutoFit/>
+            </a:bodyPr>
+            <a:lstStyle/>
+            <a:p>
+              <a:r>
+                <a:rPr lang="en-US" dirty="0"/>
+                <a:t>B</a:t>
+              </a:r>
+            </a:p>
+          </p:txBody>
+        </p:sp>
+        <p:sp>
+          <p:nvSpPr>
+            <p:cNvPr id="6" name="Freeform 5">
+              <a:extLst>
+                <a:ext uri="{FF2B5EF4-FFF2-40B4-BE49-F238E27FC236}">
+                  <a16:creationId xmlns:a16="http://schemas.microsoft.com/office/drawing/2014/main" id="{5538569D-9EA3-24D8-9521-D07C39573CC8}"/>
+                </a:ext>
+              </a:extLst>
+            </p:cNvPr>
+            <p:cNvSpPr/>
+            <p:nvPr/>
+          </p:nvSpPr>
+          <p:spPr>
+            <a:xfrm>
+              <a:off x="1250087" y="1097893"/>
+              <a:ext cx="2701636" cy="1600201"/>
+            </a:xfrm>
+            <a:custGeom>
+              <a:avLst/>
+              <a:gdLst>
+                <a:gd name="connsiteX0" fmla="*/ 0 w 1627909"/>
+                <a:gd name="connsiteY0" fmla="*/ 1600201 h 1607129"/>
+                <a:gd name="connsiteX1" fmla="*/ 568037 w 1627909"/>
+                <a:gd name="connsiteY1" fmla="*/ 1 h 1607129"/>
+                <a:gd name="connsiteX2" fmla="*/ 1627909 w 1627909"/>
+                <a:gd name="connsiteY2" fmla="*/ 1607129 h 1607129"/>
+                <a:gd name="connsiteX0" fmla="*/ 0 w 1627909"/>
+                <a:gd name="connsiteY0" fmla="*/ 1600201 h 1600201"/>
+                <a:gd name="connsiteX1" fmla="*/ 568037 w 1627909"/>
+                <a:gd name="connsiteY1" fmla="*/ 1 h 1600201"/>
+                <a:gd name="connsiteX2" fmla="*/ 1627909 w 1627909"/>
+                <a:gd name="connsiteY2" fmla="*/ 1579420 h 1600201"/>
+                <a:gd name="connsiteX0" fmla="*/ 0 w 1627909"/>
+                <a:gd name="connsiteY0" fmla="*/ 1600201 h 1600201"/>
+                <a:gd name="connsiteX1" fmla="*/ 568037 w 1627909"/>
+                <a:gd name="connsiteY1" fmla="*/ 1 h 1600201"/>
+                <a:gd name="connsiteX2" fmla="*/ 1627909 w 1627909"/>
+                <a:gd name="connsiteY2" fmla="*/ 1579420 h 1600201"/>
+                <a:gd name="connsiteX0" fmla="*/ 0 w 2008909"/>
+                <a:gd name="connsiteY0" fmla="*/ 1600201 h 1607129"/>
+                <a:gd name="connsiteX1" fmla="*/ 568037 w 2008909"/>
+                <a:gd name="connsiteY1" fmla="*/ 1 h 1607129"/>
+                <a:gd name="connsiteX2" fmla="*/ 2008909 w 2008909"/>
+                <a:gd name="connsiteY2" fmla="*/ 1607129 h 1607129"/>
+                <a:gd name="connsiteX0" fmla="*/ 0 w 2008909"/>
+                <a:gd name="connsiteY0" fmla="*/ 1600201 h 1607129"/>
+                <a:gd name="connsiteX1" fmla="*/ 568037 w 2008909"/>
+                <a:gd name="connsiteY1" fmla="*/ 1 h 1607129"/>
+                <a:gd name="connsiteX2" fmla="*/ 2008909 w 2008909"/>
+                <a:gd name="connsiteY2" fmla="*/ 1607129 h 1607129"/>
+                <a:gd name="connsiteX0" fmla="*/ 0 w 2701636"/>
+                <a:gd name="connsiteY0" fmla="*/ 1600201 h 1600201"/>
+                <a:gd name="connsiteX1" fmla="*/ 568037 w 2701636"/>
+                <a:gd name="connsiteY1" fmla="*/ 1 h 1600201"/>
+                <a:gd name="connsiteX2" fmla="*/ 2701636 w 2701636"/>
+                <a:gd name="connsiteY2" fmla="*/ 1593275 h 1600201"/>
+              </a:gdLst>
+              <a:ahLst/>
+              <a:cxnLst>
+                <a:cxn ang="0">
+                  <a:pos x="connsiteX0" y="connsiteY0"/>
+                </a:cxn>
+                <a:cxn ang="0">
+                  <a:pos x="connsiteX1" y="connsiteY1"/>
+                </a:cxn>
+                <a:cxn ang="0">
+                  <a:pos x="connsiteX2" y="connsiteY2"/>
+                </a:cxn>
+              </a:cxnLst>
+              <a:rect l="l" t="t" r="r" b="b"/>
+              <a:pathLst>
+                <a:path w="2701636" h="1600201">
+                  <a:moveTo>
+                    <a:pt x="0" y="1600201"/>
+                  </a:moveTo>
+                  <a:cubicBezTo>
+                    <a:pt x="148359" y="799523"/>
+                    <a:pt x="296719" y="-1154"/>
+                    <a:pt x="568037" y="1"/>
+                  </a:cubicBezTo>
+                  <a:cubicBezTo>
+                    <a:pt x="839355" y="1156"/>
+                    <a:pt x="1451263" y="1587502"/>
+                    <a:pt x="2701636" y="1593275"/>
+                  </a:cubicBezTo>
+                </a:path>
+              </a:pathLst>
+            </a:custGeom>
+            <a:noFill/>
+            <a:ln w="22225"/>
+          </p:spPr>
+          <p:style>
+            <a:lnRef idx="2">
+              <a:schemeClr val="accent1">
+                <a:shade val="50000"/>
+              </a:schemeClr>
+            </a:lnRef>
+            <a:fillRef idx="1">
               <a:schemeClr val="accent1"/>
-            </a:solidFill>
-            <a:tailEnd type="triangle"/>
-          </a:ln>
-        </p:spPr>
-        <p:style>
-          <a:lnRef idx="1">
-            <a:schemeClr val="accent1"/>
-          </a:lnRef>
-          <a:fillRef idx="0">
-            <a:schemeClr val="accent1"/>
-          </a:fillRef>
-          <a:effectRef idx="0">
-            <a:schemeClr val="accent1"/>
-          </a:effectRef>
-          <a:fontRef idx="minor">
-            <a:schemeClr val="tx1"/>
-          </a:fontRef>
-        </p:style>
-      </p:cxnSp>
-      <p:sp>
-        <p:nvSpPr>
-          <p:cNvPr id="7" name="TextBox 6">
-            <a:extLst>
-              <a:ext uri="{FF2B5EF4-FFF2-40B4-BE49-F238E27FC236}">
-                <a16:creationId xmlns:a16="http://schemas.microsoft.com/office/drawing/2014/main" id="{E56BE64A-248C-1D3A-A12F-3106AC73727A}"/>
+            </a:fillRef>
+            <a:effectRef idx="0">
+              <a:schemeClr val="accent1"/>
+            </a:effectRef>
+            <a:fontRef idx="minor">
+              <a:schemeClr val="lt1"/>
+            </a:fontRef>
+          </p:style>
+          <p:txBody>
+            <a:bodyPr rtlCol="0" anchor="ctr"/>
+            <a:lstStyle/>
+            <a:p>
+              <a:pPr algn="ctr"/>
+              <a:endParaRPr lang="en-US" dirty="0"/>
+            </a:p>
+          </p:txBody>
+        </p:sp>
+        <p:cxnSp>
+          <p:nvCxnSpPr>
+            <p:cNvPr id="7" name="Straight Connector 6">
+              <a:extLst>
+                <a:ext uri="{FF2B5EF4-FFF2-40B4-BE49-F238E27FC236}">
+                  <a16:creationId xmlns:a16="http://schemas.microsoft.com/office/drawing/2014/main" id="{A0368DD9-6C16-493B-0E43-E2C99EB70B6C}"/>
+                </a:ext>
+              </a:extLst>
+            </p:cNvPr>
+            <p:cNvCxnSpPr>
+              <a:cxnSpLocks/>
+            </p:cNvCxnSpPr>
+            <p:nvPr/>
+          </p:nvCxnSpPr>
+          <p:spPr>
+            <a:xfrm>
+              <a:off x="792886" y="2698094"/>
+              <a:ext cx="3540078" cy="0"/>
+            </a:xfrm>
+            <a:prstGeom prst="line">
+              <a:avLst/>
+            </a:prstGeom>
+            <a:ln w="47625">
+              <a:solidFill>
+                <a:schemeClr val="tx1"/>
+              </a:solidFill>
+            </a:ln>
+          </p:spPr>
+          <p:style>
+            <a:lnRef idx="1">
+              <a:schemeClr val="accent1"/>
+            </a:lnRef>
+            <a:fillRef idx="0">
+              <a:schemeClr val="accent1"/>
+            </a:fillRef>
+            <a:effectRef idx="0">
+              <a:schemeClr val="accent1"/>
+            </a:effectRef>
+            <a:fontRef idx="minor">
+              <a:schemeClr val="tx1"/>
+            </a:fontRef>
+          </p:style>
+        </p:cxnSp>
+      </p:grpSp>
+      <p:grpSp>
+        <p:nvGrpSpPr>
+          <p:cNvPr id="39" name="Group 38">
+            <a:extLst>
+              <a:ext uri="{FF2B5EF4-FFF2-40B4-BE49-F238E27FC236}">
+                <a16:creationId xmlns:a16="http://schemas.microsoft.com/office/drawing/2014/main" id="{8FFB07E1-D585-AD13-9A1E-30C1E9EC95FB}"/>
+              </a:ext>
+            </a:extLst>
+          </p:cNvPr>
+          <p:cNvGrpSpPr/>
+          <p:nvPr/>
+        </p:nvGrpSpPr>
+        <p:grpSpPr>
+          <a:xfrm>
+            <a:off x="6672118" y="3307899"/>
+            <a:ext cx="3540078" cy="2703277"/>
+            <a:chOff x="7271428" y="3179109"/>
+            <a:chExt cx="3540078" cy="2703277"/>
+          </a:xfrm>
+        </p:grpSpPr>
+        <p:grpSp>
+          <p:nvGrpSpPr>
+            <p:cNvPr id="25" name="Group 24">
+              <a:extLst>
+                <a:ext uri="{FF2B5EF4-FFF2-40B4-BE49-F238E27FC236}">
+                  <a16:creationId xmlns:a16="http://schemas.microsoft.com/office/drawing/2014/main" id="{6952CC36-B617-5397-18EE-047740F81D35}"/>
+                </a:ext>
+              </a:extLst>
+            </p:cNvPr>
+            <p:cNvGrpSpPr/>
+            <p:nvPr/>
+          </p:nvGrpSpPr>
+          <p:grpSpPr>
+            <a:xfrm>
+              <a:off x="7271428" y="3869740"/>
+              <a:ext cx="3540078" cy="2012646"/>
+              <a:chOff x="792886" y="1097893"/>
+              <a:chExt cx="3540078" cy="2012646"/>
+            </a:xfrm>
+          </p:grpSpPr>
+          <p:sp>
+            <p:nvSpPr>
+              <p:cNvPr id="26" name="TextBox 25">
+                <a:extLst>
+                  <a:ext uri="{FF2B5EF4-FFF2-40B4-BE49-F238E27FC236}">
+                    <a16:creationId xmlns:a16="http://schemas.microsoft.com/office/drawing/2014/main" id="{03ACDF62-2A3D-79B8-8B02-0A4CFA09E831}"/>
+                  </a:ext>
+                </a:extLst>
+              </p:cNvPr>
+              <p:cNvSpPr txBox="1"/>
+              <p:nvPr/>
+            </p:nvSpPr>
+            <p:spPr>
+              <a:xfrm>
+                <a:off x="1780984" y="2741207"/>
+                <a:ext cx="476412" cy="369332"/>
+              </a:xfrm>
+              <a:prstGeom prst="rect">
+                <a:avLst/>
+              </a:prstGeom>
+              <a:noFill/>
+            </p:spPr>
+            <p:txBody>
+              <a:bodyPr wrap="none" rtlCol="0">
+                <a:spAutoFit/>
+              </a:bodyPr>
+              <a:lstStyle/>
+              <a:p>
+                <a:r>
+                  <a:rPr lang="en-US" dirty="0"/>
+                  <a:t>0.0</a:t>
+                </a:r>
+              </a:p>
+            </p:txBody>
+          </p:sp>
+          <p:sp>
+            <p:nvSpPr>
+              <p:cNvPr id="28" name="Freeform 27">
+                <a:extLst>
+                  <a:ext uri="{FF2B5EF4-FFF2-40B4-BE49-F238E27FC236}">
+                    <a16:creationId xmlns:a16="http://schemas.microsoft.com/office/drawing/2014/main" id="{15CE7116-D6D1-5D75-2437-324F76BD204C}"/>
+                  </a:ext>
+                </a:extLst>
+              </p:cNvPr>
+              <p:cNvSpPr/>
+              <p:nvPr/>
+            </p:nvSpPr>
+            <p:spPr>
+              <a:xfrm>
+                <a:off x="1250087" y="1097893"/>
+                <a:ext cx="2701636" cy="1600201"/>
+              </a:xfrm>
+              <a:custGeom>
+                <a:avLst/>
+                <a:gdLst>
+                  <a:gd name="connsiteX0" fmla="*/ 0 w 1627909"/>
+                  <a:gd name="connsiteY0" fmla="*/ 1600201 h 1607129"/>
+                  <a:gd name="connsiteX1" fmla="*/ 568037 w 1627909"/>
+                  <a:gd name="connsiteY1" fmla="*/ 1 h 1607129"/>
+                  <a:gd name="connsiteX2" fmla="*/ 1627909 w 1627909"/>
+                  <a:gd name="connsiteY2" fmla="*/ 1607129 h 1607129"/>
+                  <a:gd name="connsiteX0" fmla="*/ 0 w 1627909"/>
+                  <a:gd name="connsiteY0" fmla="*/ 1600201 h 1600201"/>
+                  <a:gd name="connsiteX1" fmla="*/ 568037 w 1627909"/>
+                  <a:gd name="connsiteY1" fmla="*/ 1 h 1600201"/>
+                  <a:gd name="connsiteX2" fmla="*/ 1627909 w 1627909"/>
+                  <a:gd name="connsiteY2" fmla="*/ 1579420 h 1600201"/>
+                  <a:gd name="connsiteX0" fmla="*/ 0 w 1627909"/>
+                  <a:gd name="connsiteY0" fmla="*/ 1600201 h 1600201"/>
+                  <a:gd name="connsiteX1" fmla="*/ 568037 w 1627909"/>
+                  <a:gd name="connsiteY1" fmla="*/ 1 h 1600201"/>
+                  <a:gd name="connsiteX2" fmla="*/ 1627909 w 1627909"/>
+                  <a:gd name="connsiteY2" fmla="*/ 1579420 h 1600201"/>
+                  <a:gd name="connsiteX0" fmla="*/ 0 w 2008909"/>
+                  <a:gd name="connsiteY0" fmla="*/ 1600201 h 1607129"/>
+                  <a:gd name="connsiteX1" fmla="*/ 568037 w 2008909"/>
+                  <a:gd name="connsiteY1" fmla="*/ 1 h 1607129"/>
+                  <a:gd name="connsiteX2" fmla="*/ 2008909 w 2008909"/>
+                  <a:gd name="connsiteY2" fmla="*/ 1607129 h 1607129"/>
+                  <a:gd name="connsiteX0" fmla="*/ 0 w 2008909"/>
+                  <a:gd name="connsiteY0" fmla="*/ 1600201 h 1607129"/>
+                  <a:gd name="connsiteX1" fmla="*/ 568037 w 2008909"/>
+                  <a:gd name="connsiteY1" fmla="*/ 1 h 1607129"/>
+                  <a:gd name="connsiteX2" fmla="*/ 2008909 w 2008909"/>
+                  <a:gd name="connsiteY2" fmla="*/ 1607129 h 1607129"/>
+                  <a:gd name="connsiteX0" fmla="*/ 0 w 2701636"/>
+                  <a:gd name="connsiteY0" fmla="*/ 1600201 h 1600201"/>
+                  <a:gd name="connsiteX1" fmla="*/ 568037 w 2701636"/>
+                  <a:gd name="connsiteY1" fmla="*/ 1 h 1600201"/>
+                  <a:gd name="connsiteX2" fmla="*/ 2701636 w 2701636"/>
+                  <a:gd name="connsiteY2" fmla="*/ 1593275 h 1600201"/>
+                </a:gdLst>
+                <a:ahLst/>
+                <a:cxnLst>
+                  <a:cxn ang="0">
+                    <a:pos x="connsiteX0" y="connsiteY0"/>
+                  </a:cxn>
+                  <a:cxn ang="0">
+                    <a:pos x="connsiteX1" y="connsiteY1"/>
+                  </a:cxn>
+                  <a:cxn ang="0">
+                    <a:pos x="connsiteX2" y="connsiteY2"/>
+                  </a:cxn>
+                </a:cxnLst>
+                <a:rect l="l" t="t" r="r" b="b"/>
+                <a:pathLst>
+                  <a:path w="2701636" h="1600201">
+                    <a:moveTo>
+                      <a:pt x="0" y="1600201"/>
+                    </a:moveTo>
+                    <a:cubicBezTo>
+                      <a:pt x="148359" y="799523"/>
+                      <a:pt x="296719" y="-1154"/>
+                      <a:pt x="568037" y="1"/>
+                    </a:cubicBezTo>
+                    <a:cubicBezTo>
+                      <a:pt x="839355" y="1156"/>
+                      <a:pt x="1451263" y="1587502"/>
+                      <a:pt x="2701636" y="1593275"/>
+                    </a:cubicBezTo>
+                  </a:path>
+                </a:pathLst>
+              </a:custGeom>
+              <a:noFill/>
+              <a:ln w="22225"/>
+            </p:spPr>
+            <p:style>
+              <a:lnRef idx="2">
+                <a:schemeClr val="accent1">
+                  <a:shade val="50000"/>
+                </a:schemeClr>
+              </a:lnRef>
+              <a:fillRef idx="1">
+                <a:schemeClr val="accent1"/>
+              </a:fillRef>
+              <a:effectRef idx="0">
+                <a:schemeClr val="accent1"/>
+              </a:effectRef>
+              <a:fontRef idx="minor">
+                <a:schemeClr val="lt1"/>
+              </a:fontRef>
+            </p:style>
+            <p:txBody>
+              <a:bodyPr rtlCol="0" anchor="ctr"/>
+              <a:lstStyle/>
+              <a:p>
+                <a:pPr algn="ctr"/>
+                <a:endParaRPr lang="en-US" dirty="0"/>
+              </a:p>
+            </p:txBody>
+          </p:sp>
+          <p:cxnSp>
+            <p:nvCxnSpPr>
+              <p:cNvPr id="29" name="Straight Connector 28">
+                <a:extLst>
+                  <a:ext uri="{FF2B5EF4-FFF2-40B4-BE49-F238E27FC236}">
+                    <a16:creationId xmlns:a16="http://schemas.microsoft.com/office/drawing/2014/main" id="{AA466607-0FC7-4E4F-CA96-B75418453B21}"/>
+                  </a:ext>
+                </a:extLst>
+              </p:cNvPr>
+              <p:cNvCxnSpPr>
+                <a:cxnSpLocks/>
+              </p:cNvCxnSpPr>
+              <p:nvPr/>
+            </p:nvCxnSpPr>
+            <p:spPr>
+              <a:xfrm>
+                <a:off x="792886" y="2698094"/>
+                <a:ext cx="3540078" cy="0"/>
+              </a:xfrm>
+              <a:prstGeom prst="line">
+                <a:avLst/>
+              </a:prstGeom>
+              <a:ln w="47625">
+                <a:solidFill>
+                  <a:schemeClr val="tx1"/>
+                </a:solidFill>
+              </a:ln>
+            </p:spPr>
+            <p:style>
+              <a:lnRef idx="1">
+                <a:schemeClr val="accent1"/>
+              </a:lnRef>
+              <a:fillRef idx="0">
+                <a:schemeClr val="accent1"/>
+              </a:fillRef>
+              <a:effectRef idx="0">
+                <a:schemeClr val="accent1"/>
+              </a:effectRef>
+              <a:fontRef idx="minor">
+                <a:schemeClr val="tx1"/>
+              </a:fontRef>
+            </p:style>
+          </p:cxnSp>
+        </p:grpSp>
+        <p:cxnSp>
+          <p:nvCxnSpPr>
+            <p:cNvPr id="31" name="Straight Connector 30">
+              <a:extLst>
+                <a:ext uri="{FF2B5EF4-FFF2-40B4-BE49-F238E27FC236}">
+                  <a16:creationId xmlns:a16="http://schemas.microsoft.com/office/drawing/2014/main" id="{8F97F2D5-8D4F-A32F-9B78-19728BC090EC}"/>
+                </a:ext>
+              </a:extLst>
+            </p:cNvPr>
+            <p:cNvCxnSpPr/>
+            <p:nvPr/>
+          </p:nvCxnSpPr>
+          <p:spPr>
+            <a:xfrm>
+              <a:off x="8497732" y="3657600"/>
+              <a:ext cx="0" cy="1812341"/>
+            </a:xfrm>
+            <a:prstGeom prst="line">
+              <a:avLst/>
+            </a:prstGeom>
+            <a:ln w="19050">
+              <a:solidFill>
+                <a:schemeClr val="accent2"/>
+              </a:solidFill>
+              <a:prstDash val="dash"/>
+            </a:ln>
+          </p:spPr>
+          <p:style>
+            <a:lnRef idx="1">
+              <a:schemeClr val="accent1"/>
+            </a:lnRef>
+            <a:fillRef idx="0">
+              <a:schemeClr val="accent1"/>
+            </a:fillRef>
+            <a:effectRef idx="0">
+              <a:schemeClr val="accent1"/>
+            </a:effectRef>
+            <a:fontRef idx="minor">
+              <a:schemeClr val="tx1"/>
+            </a:fontRef>
+          </p:style>
+        </p:cxnSp>
+        <p:sp>
+          <p:nvSpPr>
+            <p:cNvPr id="32" name="TextBox 31">
+              <a:extLst>
+                <a:ext uri="{FF2B5EF4-FFF2-40B4-BE49-F238E27FC236}">
+                  <a16:creationId xmlns:a16="http://schemas.microsoft.com/office/drawing/2014/main" id="{CA17803A-0518-E6B6-B75D-641DE4E74413}"/>
+                </a:ext>
+              </a:extLst>
+            </p:cNvPr>
+            <p:cNvSpPr txBox="1"/>
+            <p:nvPr/>
+          </p:nvSpPr>
+          <p:spPr>
+            <a:xfrm>
+              <a:off x="9021248" y="3906071"/>
+              <a:ext cx="476412" cy="369332"/>
+            </a:xfrm>
+            <a:prstGeom prst="rect">
+              <a:avLst/>
+            </a:prstGeom>
+            <a:noFill/>
+          </p:spPr>
+          <p:txBody>
+            <a:bodyPr wrap="none" rtlCol="0">
+              <a:spAutoFit/>
+            </a:bodyPr>
+            <a:lstStyle/>
+            <a:p>
+              <a:r>
+                <a:rPr lang="en-US" dirty="0"/>
+                <a:t>1.0</a:t>
+              </a:r>
+            </a:p>
+          </p:txBody>
+        </p:sp>
+        <p:cxnSp>
+          <p:nvCxnSpPr>
+            <p:cNvPr id="34" name="Straight Arrow Connector 33">
+              <a:extLst>
+                <a:ext uri="{FF2B5EF4-FFF2-40B4-BE49-F238E27FC236}">
+                  <a16:creationId xmlns:a16="http://schemas.microsoft.com/office/drawing/2014/main" id="{D4F73358-8634-1260-C016-0544F23D1AD6}"/>
+                </a:ext>
+              </a:extLst>
+            </p:cNvPr>
+            <p:cNvCxnSpPr/>
+            <p:nvPr/>
+          </p:nvCxnSpPr>
+          <p:spPr>
+            <a:xfrm>
+              <a:off x="8497732" y="4090737"/>
+              <a:ext cx="543735" cy="0"/>
+            </a:xfrm>
+            <a:prstGeom prst="straightConnector1">
+              <a:avLst/>
+            </a:prstGeom>
+            <a:ln w="9525">
+              <a:solidFill>
+                <a:schemeClr val="accent2"/>
+              </a:solidFill>
+              <a:tailEnd type="triangle"/>
+            </a:ln>
+          </p:spPr>
+          <p:style>
+            <a:lnRef idx="1">
+              <a:schemeClr val="accent1"/>
+            </a:lnRef>
+            <a:fillRef idx="0">
+              <a:schemeClr val="accent1"/>
+            </a:fillRef>
+            <a:effectRef idx="0">
+              <a:schemeClr val="accent1"/>
+            </a:effectRef>
+            <a:fontRef idx="minor">
+              <a:schemeClr val="tx1"/>
+            </a:fontRef>
+          </p:style>
+        </p:cxnSp>
+        <p:sp>
+          <p:nvSpPr>
+            <p:cNvPr id="35" name="TextBox 34">
+              <a:extLst>
+                <a:ext uri="{FF2B5EF4-FFF2-40B4-BE49-F238E27FC236}">
+                  <a16:creationId xmlns:a16="http://schemas.microsoft.com/office/drawing/2014/main" id="{3D26FF0B-C4A7-EBE9-7253-7FE2A99BAD44}"/>
+                </a:ext>
+              </a:extLst>
+            </p:cNvPr>
+            <p:cNvSpPr txBox="1"/>
+            <p:nvPr/>
+          </p:nvSpPr>
+          <p:spPr>
+            <a:xfrm>
+              <a:off x="7607331" y="3179109"/>
+              <a:ext cx="2000869" cy="461665"/>
+            </a:xfrm>
+            <a:prstGeom prst="rect">
+              <a:avLst/>
+            </a:prstGeom>
+            <a:noFill/>
+          </p:spPr>
+          <p:txBody>
+            <a:bodyPr wrap="none" rtlCol="0">
+              <a:spAutoFit/>
+            </a:bodyPr>
+            <a:lstStyle/>
+            <a:p>
+              <a:r>
+                <a:rPr lang="en-US" sz="2400" dirty="0">
+                  <a:solidFill>
+                    <a:schemeClr val="accent2"/>
+                  </a:solidFill>
+                  <a:latin typeface="Arial" panose="020B0604020202020204" pitchFamily="34" charset="0"/>
+                  <a:cs typeface="Arial" panose="020B0604020202020204" pitchFamily="34" charset="0"/>
+                </a:rPr>
+                <a:t>Standardized</a:t>
+              </a:r>
+            </a:p>
+          </p:txBody>
+        </p:sp>
+      </p:grpSp>
+      <p:sp>
+        <p:nvSpPr>
+          <p:cNvPr id="36" name="TextBox 35">
+            <a:extLst>
+              <a:ext uri="{FF2B5EF4-FFF2-40B4-BE49-F238E27FC236}">
+                <a16:creationId xmlns:a16="http://schemas.microsoft.com/office/drawing/2014/main" id="{FB365196-9570-7D56-0A7E-33D68469AB76}"/>
               </a:ext>
             </a:extLst>
           </p:cNvPr>
@@ -4345,8 +4922,8 @@
         </p:nvSpPr>
         <p:spPr>
           <a:xfrm>
-            <a:off x="7020877" y="2060870"/>
-            <a:ext cx="853119" cy="461665"/>
+            <a:off x="5259395" y="402175"/>
+            <a:ext cx="1247457" cy="461665"/>
           </a:xfrm>
           <a:prstGeom prst="rect">
             <a:avLst/>
@@ -4359,151 +4936,340 @@
           </a:bodyPr>
           <a:lstStyle/>
           <a:p>
-            <a:r>
-              <a:rPr lang="en-US" sz="2400" b="1" dirty="0">
-                <a:latin typeface="Arial" panose="020B0604020202020204" pitchFamily="34" charset="0"/>
-                <a:cs typeface="Arial" panose="020B0604020202020204" pitchFamily="34" charset="0"/>
-              </a:rPr>
-              <a:t>KNN</a:t>
-            </a:r>
-          </a:p>
-        </p:txBody>
-      </p:sp>
-      <p:cxnSp>
-        <p:nvCxnSpPr>
-          <p:cNvPr id="8" name="Straight Arrow Connector 7">
-            <a:extLst>
-              <a:ext uri="{FF2B5EF4-FFF2-40B4-BE49-F238E27FC236}">
-                <a16:creationId xmlns:a16="http://schemas.microsoft.com/office/drawing/2014/main" id="{392CC2D6-2C20-7E7E-7860-B5393F552ED6}"/>
-              </a:ext>
-            </a:extLst>
-          </p:cNvPr>
-          <p:cNvCxnSpPr>
-            <a:cxnSpLocks/>
-          </p:cNvCxnSpPr>
-          <p:nvPr/>
-        </p:nvCxnSpPr>
-        <p:spPr>
-          <a:xfrm flipH="1" flipV="1">
-            <a:off x="5754814" y="3428998"/>
-            <a:ext cx="1560386" cy="385764"/>
-          </a:xfrm>
-          <a:prstGeom prst="straightConnector1">
-            <a:avLst/>
-          </a:prstGeom>
-          <a:ln w="31750">
-            <a:solidFill>
-              <a:schemeClr val="accent2"/>
-            </a:solidFill>
-            <a:tailEnd type="triangle"/>
-          </a:ln>
-        </p:spPr>
-        <p:style>
-          <a:lnRef idx="1">
-            <a:schemeClr val="accent1"/>
-          </a:lnRef>
-          <a:fillRef idx="0">
-            <a:schemeClr val="accent1"/>
-          </a:fillRef>
-          <a:effectRef idx="0">
-            <a:schemeClr val="accent1"/>
-          </a:effectRef>
-          <a:fontRef idx="minor">
-            <a:schemeClr val="tx1"/>
-          </a:fontRef>
-        </p:style>
-      </p:cxnSp>
-      <p:sp>
-        <p:nvSpPr>
-          <p:cNvPr id="10" name="TextBox 9">
-            <a:extLst>
-              <a:ext uri="{FF2B5EF4-FFF2-40B4-BE49-F238E27FC236}">
-                <a16:creationId xmlns:a16="http://schemas.microsoft.com/office/drawing/2014/main" id="{3BD93877-6DC1-93F7-6BAF-A69728F8F9CD}"/>
-              </a:ext>
-            </a:extLst>
-          </p:cNvPr>
-          <p:cNvSpPr txBox="1"/>
-          <p:nvPr/>
-        </p:nvSpPr>
-        <p:spPr>
-          <a:xfrm>
-            <a:off x="7438619" y="3621880"/>
-            <a:ext cx="3910418" cy="1938992"/>
-          </a:xfrm>
-          <a:prstGeom prst="rect">
-            <a:avLst/>
-          </a:prstGeom>
-          <a:noFill/>
-        </p:spPr>
-        <p:txBody>
-          <a:bodyPr wrap="square" rtlCol="0">
-            <a:spAutoFit/>
-          </a:bodyPr>
-          <a:lstStyle/>
-          <a:p>
-            <a:r>
-              <a:rPr lang="en-US" sz="2400" b="1" dirty="0">
-                <a:latin typeface="Arial" panose="020B0604020202020204" pitchFamily="34" charset="0"/>
-                <a:cs typeface="Arial" panose="020B0604020202020204" pitchFamily="34" charset="0"/>
-              </a:rPr>
-              <a:t>Features:</a:t>
-            </a:r>
-          </a:p>
-          <a:p>
-            <a:pPr marL="342900" indent="-342900">
-              <a:buFontTx/>
-              <a:buChar char="-"/>
-            </a:pPr>
             <a:r>
               <a:rPr lang="en-US" sz="2400" dirty="0">
                 <a:latin typeface="Arial" panose="020B0604020202020204" pitchFamily="34" charset="0"/>
                 <a:cs typeface="Arial" panose="020B0604020202020204" pitchFamily="34" charset="0"/>
               </a:rPr>
-              <a:t>QAS ratio</a:t>
+              <a:t>Original</a:t>
             </a:r>
           </a:p>
-          <a:p>
-            <a:pPr marL="342900" indent="-342900">
-              <a:buFontTx/>
-              <a:buChar char="-"/>
-            </a:pPr>
-            <a:r>
-              <a:rPr lang="en-US" sz="2400" dirty="0">
-                <a:latin typeface="Arial" panose="020B0604020202020204" pitchFamily="34" charset="0"/>
-                <a:cs typeface="Arial" panose="020B0604020202020204" pitchFamily="34" charset="0"/>
-              </a:rPr>
-              <a:t>HBD (OneHot encoded)</a:t>
-            </a:r>
-          </a:p>
-          <a:p>
-            <a:pPr marL="342900" indent="-342900">
-              <a:buFontTx/>
-              <a:buChar char="-"/>
-            </a:pPr>
-            <a:r>
-              <a:rPr lang="en-US" sz="2400" dirty="0">
-                <a:latin typeface="Arial" panose="020B0604020202020204" pitchFamily="34" charset="0"/>
-                <a:cs typeface="Arial" panose="020B0604020202020204" pitchFamily="34" charset="0"/>
-              </a:rPr>
-              <a:t>QAS (OneHot encoded)</a:t>
-            </a:r>
-          </a:p>
-          <a:p>
-            <a:pPr marL="342900" indent="-342900">
-              <a:buFontTx/>
-              <a:buChar char="-"/>
-            </a:pPr>
-            <a:endParaRPr lang="en-US" sz="2400" dirty="0">
-              <a:latin typeface="Arial" panose="020B0604020202020204" pitchFamily="34" charset="0"/>
-              <a:cs typeface="Arial" panose="020B0604020202020204" pitchFamily="34" charset="0"/>
-            </a:endParaRPr>
-          </a:p>
-        </p:txBody>
-      </p:sp>
+        </p:txBody>
+      </p:sp>
+      <p:grpSp>
+        <p:nvGrpSpPr>
+          <p:cNvPr id="38" name="Group 37">
+            <a:extLst>
+              <a:ext uri="{FF2B5EF4-FFF2-40B4-BE49-F238E27FC236}">
+                <a16:creationId xmlns:a16="http://schemas.microsoft.com/office/drawing/2014/main" id="{ADA30DC2-A02B-2B6D-2A99-000056F8D63F}"/>
+              </a:ext>
+            </a:extLst>
+          </p:cNvPr>
+          <p:cNvGrpSpPr/>
+          <p:nvPr/>
+        </p:nvGrpSpPr>
+        <p:grpSpPr>
+          <a:xfrm>
+            <a:off x="2152470" y="3283313"/>
+            <a:ext cx="3706790" cy="2726699"/>
+            <a:chOff x="730901" y="3155687"/>
+            <a:chExt cx="3706790" cy="2726699"/>
+          </a:xfrm>
+        </p:grpSpPr>
+        <p:grpSp>
+          <p:nvGrpSpPr>
+            <p:cNvPr id="20" name="Group 19">
+              <a:extLst>
+                <a:ext uri="{FF2B5EF4-FFF2-40B4-BE49-F238E27FC236}">
+                  <a16:creationId xmlns:a16="http://schemas.microsoft.com/office/drawing/2014/main" id="{3E011C4A-F7D9-BF85-DBE7-0B8C84657A68}"/>
+                </a:ext>
+              </a:extLst>
+            </p:cNvPr>
+            <p:cNvGrpSpPr/>
+            <p:nvPr/>
+          </p:nvGrpSpPr>
+          <p:grpSpPr>
+            <a:xfrm>
+              <a:off x="730901" y="3869740"/>
+              <a:ext cx="3706790" cy="2012646"/>
+              <a:chOff x="792886" y="1097893"/>
+              <a:chExt cx="3706790" cy="2012646"/>
+            </a:xfrm>
+          </p:grpSpPr>
+          <p:sp>
+            <p:nvSpPr>
+              <p:cNvPr id="21" name="TextBox 20">
+                <a:extLst>
+                  <a:ext uri="{FF2B5EF4-FFF2-40B4-BE49-F238E27FC236}">
+                    <a16:creationId xmlns:a16="http://schemas.microsoft.com/office/drawing/2014/main" id="{B37FF42B-558F-F9D9-EE72-C8D6C1CEB223}"/>
+                  </a:ext>
+                </a:extLst>
+              </p:cNvPr>
+              <p:cNvSpPr txBox="1"/>
+              <p:nvPr/>
+            </p:nvSpPr>
+            <p:spPr>
+              <a:xfrm>
+                <a:off x="1018807" y="2741207"/>
+                <a:ext cx="476412" cy="369332"/>
+              </a:xfrm>
+              <a:prstGeom prst="rect">
+                <a:avLst/>
+              </a:prstGeom>
+              <a:noFill/>
+            </p:spPr>
+            <p:txBody>
+              <a:bodyPr wrap="none" rtlCol="0">
+                <a:spAutoFit/>
+              </a:bodyPr>
+              <a:lstStyle/>
+              <a:p>
+                <a:r>
+                  <a:rPr lang="en-US" dirty="0">
+                    <a:solidFill>
+                      <a:srgbClr val="7030A0"/>
+                    </a:solidFill>
+                  </a:rPr>
+                  <a:t>0.0</a:t>
+                </a:r>
+              </a:p>
+            </p:txBody>
+          </p:sp>
+          <p:sp>
+            <p:nvSpPr>
+              <p:cNvPr id="22" name="TextBox 21">
+                <a:extLst>
+                  <a:ext uri="{FF2B5EF4-FFF2-40B4-BE49-F238E27FC236}">
+                    <a16:creationId xmlns:a16="http://schemas.microsoft.com/office/drawing/2014/main" id="{0187EE3F-9FC3-76E7-6D0D-BEF3E92692CE}"/>
+                  </a:ext>
+                </a:extLst>
+              </p:cNvPr>
+              <p:cNvSpPr txBox="1"/>
+              <p:nvPr/>
+            </p:nvSpPr>
+            <p:spPr>
+              <a:xfrm>
+                <a:off x="4023264" y="2741207"/>
+                <a:ext cx="476412" cy="369332"/>
+              </a:xfrm>
+              <a:prstGeom prst="rect">
+                <a:avLst/>
+              </a:prstGeom>
+              <a:noFill/>
+            </p:spPr>
+            <p:txBody>
+              <a:bodyPr wrap="none" rtlCol="0">
+                <a:spAutoFit/>
+              </a:bodyPr>
+              <a:lstStyle/>
+              <a:p>
+                <a:r>
+                  <a:rPr lang="en-US" dirty="0">
+                    <a:solidFill>
+                      <a:srgbClr val="7030A0"/>
+                    </a:solidFill>
+                  </a:rPr>
+                  <a:t>1.0</a:t>
+                </a:r>
+              </a:p>
+            </p:txBody>
+          </p:sp>
+          <p:sp>
+            <p:nvSpPr>
+              <p:cNvPr id="23" name="Freeform 22">
+                <a:extLst>
+                  <a:ext uri="{FF2B5EF4-FFF2-40B4-BE49-F238E27FC236}">
+                    <a16:creationId xmlns:a16="http://schemas.microsoft.com/office/drawing/2014/main" id="{2B062A0B-1BAF-D3CB-44B0-0898FC31D1FC}"/>
+                  </a:ext>
+                </a:extLst>
+              </p:cNvPr>
+              <p:cNvSpPr/>
+              <p:nvPr/>
+            </p:nvSpPr>
+            <p:spPr>
+              <a:xfrm>
+                <a:off x="1250087" y="1097893"/>
+                <a:ext cx="2701636" cy="1600201"/>
+              </a:xfrm>
+              <a:custGeom>
+                <a:avLst/>
+                <a:gdLst>
+                  <a:gd name="connsiteX0" fmla="*/ 0 w 1627909"/>
+                  <a:gd name="connsiteY0" fmla="*/ 1600201 h 1607129"/>
+                  <a:gd name="connsiteX1" fmla="*/ 568037 w 1627909"/>
+                  <a:gd name="connsiteY1" fmla="*/ 1 h 1607129"/>
+                  <a:gd name="connsiteX2" fmla="*/ 1627909 w 1627909"/>
+                  <a:gd name="connsiteY2" fmla="*/ 1607129 h 1607129"/>
+                  <a:gd name="connsiteX0" fmla="*/ 0 w 1627909"/>
+                  <a:gd name="connsiteY0" fmla="*/ 1600201 h 1600201"/>
+                  <a:gd name="connsiteX1" fmla="*/ 568037 w 1627909"/>
+                  <a:gd name="connsiteY1" fmla="*/ 1 h 1600201"/>
+                  <a:gd name="connsiteX2" fmla="*/ 1627909 w 1627909"/>
+                  <a:gd name="connsiteY2" fmla="*/ 1579420 h 1600201"/>
+                  <a:gd name="connsiteX0" fmla="*/ 0 w 1627909"/>
+                  <a:gd name="connsiteY0" fmla="*/ 1600201 h 1600201"/>
+                  <a:gd name="connsiteX1" fmla="*/ 568037 w 1627909"/>
+                  <a:gd name="connsiteY1" fmla="*/ 1 h 1600201"/>
+                  <a:gd name="connsiteX2" fmla="*/ 1627909 w 1627909"/>
+                  <a:gd name="connsiteY2" fmla="*/ 1579420 h 1600201"/>
+                  <a:gd name="connsiteX0" fmla="*/ 0 w 2008909"/>
+                  <a:gd name="connsiteY0" fmla="*/ 1600201 h 1607129"/>
+                  <a:gd name="connsiteX1" fmla="*/ 568037 w 2008909"/>
+                  <a:gd name="connsiteY1" fmla="*/ 1 h 1607129"/>
+                  <a:gd name="connsiteX2" fmla="*/ 2008909 w 2008909"/>
+                  <a:gd name="connsiteY2" fmla="*/ 1607129 h 1607129"/>
+                  <a:gd name="connsiteX0" fmla="*/ 0 w 2008909"/>
+                  <a:gd name="connsiteY0" fmla="*/ 1600201 h 1607129"/>
+                  <a:gd name="connsiteX1" fmla="*/ 568037 w 2008909"/>
+                  <a:gd name="connsiteY1" fmla="*/ 1 h 1607129"/>
+                  <a:gd name="connsiteX2" fmla="*/ 2008909 w 2008909"/>
+                  <a:gd name="connsiteY2" fmla="*/ 1607129 h 1607129"/>
+                  <a:gd name="connsiteX0" fmla="*/ 0 w 2701636"/>
+                  <a:gd name="connsiteY0" fmla="*/ 1600201 h 1600201"/>
+                  <a:gd name="connsiteX1" fmla="*/ 568037 w 2701636"/>
+                  <a:gd name="connsiteY1" fmla="*/ 1 h 1600201"/>
+                  <a:gd name="connsiteX2" fmla="*/ 2701636 w 2701636"/>
+                  <a:gd name="connsiteY2" fmla="*/ 1593275 h 1600201"/>
+                </a:gdLst>
+                <a:ahLst/>
+                <a:cxnLst>
+                  <a:cxn ang="0">
+                    <a:pos x="connsiteX0" y="connsiteY0"/>
+                  </a:cxn>
+                  <a:cxn ang="0">
+                    <a:pos x="connsiteX1" y="connsiteY1"/>
+                  </a:cxn>
+                  <a:cxn ang="0">
+                    <a:pos x="connsiteX2" y="connsiteY2"/>
+                  </a:cxn>
+                </a:cxnLst>
+                <a:rect l="l" t="t" r="r" b="b"/>
+                <a:pathLst>
+                  <a:path w="2701636" h="1600201">
+                    <a:moveTo>
+                      <a:pt x="0" y="1600201"/>
+                    </a:moveTo>
+                    <a:cubicBezTo>
+                      <a:pt x="148359" y="799523"/>
+                      <a:pt x="296719" y="-1154"/>
+                      <a:pt x="568037" y="1"/>
+                    </a:cubicBezTo>
+                    <a:cubicBezTo>
+                      <a:pt x="839355" y="1156"/>
+                      <a:pt x="1451263" y="1587502"/>
+                      <a:pt x="2701636" y="1593275"/>
+                    </a:cubicBezTo>
+                  </a:path>
+                </a:pathLst>
+              </a:custGeom>
+              <a:noFill/>
+              <a:ln w="22225"/>
+            </p:spPr>
+            <p:style>
+              <a:lnRef idx="2">
+                <a:schemeClr val="accent1">
+                  <a:shade val="50000"/>
+                </a:schemeClr>
+              </a:lnRef>
+              <a:fillRef idx="1">
+                <a:schemeClr val="accent1"/>
+              </a:fillRef>
+              <a:effectRef idx="0">
+                <a:schemeClr val="accent1"/>
+              </a:effectRef>
+              <a:fontRef idx="minor">
+                <a:schemeClr val="lt1"/>
+              </a:fontRef>
+            </p:style>
+            <p:txBody>
+              <a:bodyPr rtlCol="0" anchor="ctr"/>
+              <a:lstStyle/>
+              <a:p>
+                <a:pPr algn="ctr"/>
+                <a:endParaRPr lang="en-US" dirty="0"/>
+              </a:p>
+            </p:txBody>
+          </p:sp>
+          <p:cxnSp>
+            <p:nvCxnSpPr>
+              <p:cNvPr id="24" name="Straight Connector 23">
+                <a:extLst>
+                  <a:ext uri="{FF2B5EF4-FFF2-40B4-BE49-F238E27FC236}">
+                    <a16:creationId xmlns:a16="http://schemas.microsoft.com/office/drawing/2014/main" id="{F7D04893-5A85-D4F2-A6A3-F028A22D9163}"/>
+                  </a:ext>
+                </a:extLst>
+              </p:cNvPr>
+              <p:cNvCxnSpPr>
+                <a:cxnSpLocks/>
+              </p:cNvCxnSpPr>
+              <p:nvPr/>
+            </p:nvCxnSpPr>
+            <p:spPr>
+              <a:xfrm>
+                <a:off x="792886" y="2698094"/>
+                <a:ext cx="3540078" cy="0"/>
+              </a:xfrm>
+              <a:prstGeom prst="line">
+                <a:avLst/>
+              </a:prstGeom>
+              <a:ln w="47625">
+                <a:solidFill>
+                  <a:schemeClr val="tx1"/>
+                </a:solidFill>
+              </a:ln>
+            </p:spPr>
+            <p:style>
+              <a:lnRef idx="1">
+                <a:schemeClr val="accent1"/>
+              </a:lnRef>
+              <a:fillRef idx="0">
+                <a:schemeClr val="accent1"/>
+              </a:fillRef>
+              <a:effectRef idx="0">
+                <a:schemeClr val="accent1"/>
+              </a:effectRef>
+              <a:fontRef idx="minor">
+                <a:schemeClr val="tx1"/>
+              </a:fontRef>
+            </p:style>
+          </p:cxnSp>
+        </p:grpSp>
+        <p:sp>
+          <p:nvSpPr>
+            <p:cNvPr id="37" name="TextBox 36">
+              <a:extLst>
+                <a:ext uri="{FF2B5EF4-FFF2-40B4-BE49-F238E27FC236}">
+                  <a16:creationId xmlns:a16="http://schemas.microsoft.com/office/drawing/2014/main" id="{1B31EC19-5075-D30C-9C7F-D2ABFF98E73D}"/>
+                </a:ext>
+              </a:extLst>
+            </p:cNvPr>
+            <p:cNvSpPr txBox="1"/>
+            <p:nvPr/>
+          </p:nvSpPr>
+          <p:spPr>
+            <a:xfrm>
+              <a:off x="956822" y="3155687"/>
+              <a:ext cx="2291012" cy="461665"/>
+            </a:xfrm>
+            <a:prstGeom prst="rect">
+              <a:avLst/>
+            </a:prstGeom>
+            <a:noFill/>
+          </p:spPr>
+          <p:txBody>
+            <a:bodyPr wrap="none" rtlCol="0">
+              <a:spAutoFit/>
+            </a:bodyPr>
+            <a:lstStyle/>
+            <a:p>
+              <a:r>
+                <a:rPr lang="en-US" sz="2400" dirty="0">
+                  <a:solidFill>
+                    <a:srgbClr val="7030A0"/>
+                  </a:solidFill>
+                  <a:latin typeface="Arial" panose="020B0604020202020204" pitchFamily="34" charset="0"/>
+                  <a:cs typeface="Arial" panose="020B0604020202020204" pitchFamily="34" charset="0"/>
+                </a:rPr>
+                <a:t>Minmax Scaled</a:t>
+              </a:r>
+            </a:p>
+          </p:txBody>
+        </p:sp>
+      </p:grpSp>
     </p:spTree>
     <p:extLst>
       <p:ext uri="{BB962C8B-B14F-4D97-AF65-F5344CB8AC3E}">
-        <p14:creationId xmlns:p14="http://schemas.microsoft.com/office/powerpoint/2010/main" val="1929043888"/>
+        <p14:creationId xmlns:p14="http://schemas.microsoft.com/office/powerpoint/2010/main" val="196634960"/>
       </p:ext>
     </p:extLst>
   </p:cSld>
@@ -4530,298 +5296,61 @@
           <a:chExt cx="0" cy="0"/>
         </a:xfrm>
       </p:grpSpPr>
-      <p:sp>
-        <p:nvSpPr>
-          <p:cNvPr id="4" name="Rectangle 3">
-            <a:extLst>
-              <a:ext uri="{FF2B5EF4-FFF2-40B4-BE49-F238E27FC236}">
-                <a16:creationId xmlns:a16="http://schemas.microsoft.com/office/drawing/2014/main" id="{3BFD8038-4CE5-A164-57BB-E096AE82647B}"/>
-              </a:ext>
-            </a:extLst>
-          </p:cNvPr>
-          <p:cNvSpPr/>
-          <p:nvPr/>
-        </p:nvSpPr>
-        <p:spPr>
-          <a:xfrm>
-            <a:off x="2672508" y="3051313"/>
-            <a:ext cx="3291840" cy="755374"/>
+      <p:pic>
+        <p:nvPicPr>
+          <p:cNvPr id="4" name="Picture 3">
+            <a:extLst>
+              <a:ext uri="{FF2B5EF4-FFF2-40B4-BE49-F238E27FC236}">
+                <a16:creationId xmlns:a16="http://schemas.microsoft.com/office/drawing/2014/main" id="{49C11C3B-7523-BA4F-97A3-750677216B42}"/>
+              </a:ext>
+            </a:extLst>
+          </p:cNvPr>
+          <p:cNvPicPr>
+            <a:picLocks noChangeAspect="1"/>
+          </p:cNvPicPr>
+          <p:nvPr/>
+        </p:nvPicPr>
+        <p:blipFill>
+          <a:blip r:embed="rId2"/>
+          <a:stretch>
+            <a:fillRect/>
+          </a:stretch>
+        </p:blipFill>
+        <p:spPr>
+          <a:xfrm>
+            <a:off x="-785812" y="2060870"/>
+            <a:ext cx="11536419" cy="2736257"/>
           </a:xfrm>
           <a:prstGeom prst="rect">
             <a:avLst/>
           </a:prstGeom>
-          <a:solidFill>
-            <a:schemeClr val="accent1">
-              <a:lumMod val="40000"/>
-              <a:lumOff val="60000"/>
-            </a:schemeClr>
-          </a:solidFill>
-          <a:ln w="38100"/>
-        </p:spPr>
-        <p:style>
-          <a:lnRef idx="2">
-            <a:schemeClr val="accent1">
-              <a:shade val="50000"/>
-            </a:schemeClr>
-          </a:lnRef>
-          <a:fillRef idx="1">
-            <a:schemeClr val="accent1"/>
-          </a:fillRef>
-          <a:effectRef idx="0">
-            <a:schemeClr val="accent1"/>
-          </a:effectRef>
-          <a:fontRef idx="minor">
-            <a:schemeClr val="lt1"/>
-          </a:fontRef>
-        </p:style>
-        <p:txBody>
-          <a:bodyPr rtlCol="0" anchor="ctr"/>
-          <a:lstStyle/>
-          <a:p>
-            <a:pPr algn="ctr"/>
-            <a:r>
-              <a:rPr lang="en-US" sz="2800" dirty="0">
-                <a:solidFill>
-                  <a:schemeClr val="tx1"/>
-                </a:solidFill>
-                <a:latin typeface="Arial" panose="020B0604020202020204" pitchFamily="34" charset="0"/>
-                <a:cs typeface="Arial" panose="020B0604020202020204" pitchFamily="34" charset="0"/>
-              </a:rPr>
-              <a:t>Feature </a:t>
-            </a:r>
-            <a:r>
-              <a:rPr lang="en-US" sz="2800" b="1" dirty="0">
-                <a:solidFill>
-                  <a:schemeClr val="tx1"/>
-                </a:solidFill>
-                <a:latin typeface="Arial" panose="020B0604020202020204" pitchFamily="34" charset="0"/>
-                <a:cs typeface="Arial" panose="020B0604020202020204" pitchFamily="34" charset="0"/>
-              </a:rPr>
-              <a:t>Extraction</a:t>
-            </a:r>
-          </a:p>
-        </p:txBody>
-      </p:sp>
-      <p:sp>
-        <p:nvSpPr>
-          <p:cNvPr id="5" name="Rectangle 4">
-            <a:extLst>
-              <a:ext uri="{FF2B5EF4-FFF2-40B4-BE49-F238E27FC236}">
-                <a16:creationId xmlns:a16="http://schemas.microsoft.com/office/drawing/2014/main" id="{8194E040-DF4C-3072-615B-0E0453CB2CF4}"/>
-              </a:ext>
-            </a:extLst>
-          </p:cNvPr>
-          <p:cNvSpPr/>
-          <p:nvPr/>
-        </p:nvSpPr>
-        <p:spPr>
-          <a:xfrm>
-            <a:off x="6275774" y="3051313"/>
-            <a:ext cx="3291840" cy="755374"/>
-          </a:xfrm>
-          <a:prstGeom prst="rect">
-            <a:avLst/>
-          </a:prstGeom>
-          <a:solidFill>
-            <a:schemeClr val="accent2">
-              <a:lumMod val="20000"/>
-              <a:lumOff val="80000"/>
-            </a:schemeClr>
-          </a:solidFill>
-          <a:ln w="38100">
+        </p:spPr>
+      </p:pic>
+      <p:cxnSp>
+        <p:nvCxnSpPr>
+          <p:cNvPr id="6" name="Straight Arrow Connector 5">
+            <a:extLst>
+              <a:ext uri="{FF2B5EF4-FFF2-40B4-BE49-F238E27FC236}">
+                <a16:creationId xmlns:a16="http://schemas.microsoft.com/office/drawing/2014/main" id="{4B355336-D1BC-81D2-8482-D97591D537AD}"/>
+              </a:ext>
+            </a:extLst>
+          </p:cNvPr>
+          <p:cNvCxnSpPr/>
+          <p:nvPr/>
+        </p:nvCxnSpPr>
+        <p:spPr>
+          <a:xfrm flipH="1">
+            <a:off x="5630989" y="2316479"/>
+            <a:ext cx="1389888" cy="243840"/>
+          </a:xfrm>
+          <a:prstGeom prst="straightConnector1">
+            <a:avLst/>
+          </a:prstGeom>
+          <a:ln w="31750">
             <a:solidFill>
-              <a:schemeClr val="accent2">
-                <a:lumMod val="50000"/>
-              </a:schemeClr>
+              <a:schemeClr val="accent1"/>
             </a:solidFill>
-          </a:ln>
-        </p:spPr>
-        <p:style>
-          <a:lnRef idx="2">
-            <a:schemeClr val="accent1">
-              <a:shade val="50000"/>
-            </a:schemeClr>
-          </a:lnRef>
-          <a:fillRef idx="1">
-            <a:schemeClr val="accent1"/>
-          </a:fillRef>
-          <a:effectRef idx="0">
-            <a:schemeClr val="accent1"/>
-          </a:effectRef>
-          <a:fontRef idx="minor">
-            <a:schemeClr val="lt1"/>
-          </a:fontRef>
-        </p:style>
-        <p:txBody>
-          <a:bodyPr rtlCol="0" anchor="ctr"/>
-          <a:lstStyle/>
-          <a:p>
-            <a:pPr algn="ctr"/>
-            <a:r>
-              <a:rPr lang="en-US" sz="2800" dirty="0">
-                <a:solidFill>
-                  <a:schemeClr val="tx1"/>
-                </a:solidFill>
-                <a:latin typeface="Arial" panose="020B0604020202020204" pitchFamily="34" charset="0"/>
-                <a:cs typeface="Arial" panose="020B0604020202020204" pitchFamily="34" charset="0"/>
-              </a:rPr>
-              <a:t>Feature </a:t>
-            </a:r>
-            <a:r>
-              <a:rPr lang="en-US" sz="2800" b="1" dirty="0">
-                <a:solidFill>
-                  <a:schemeClr val="tx1"/>
-                </a:solidFill>
-                <a:latin typeface="Arial" panose="020B0604020202020204" pitchFamily="34" charset="0"/>
-                <a:cs typeface="Arial" panose="020B0604020202020204" pitchFamily="34" charset="0"/>
-              </a:rPr>
-              <a:t>Selection</a:t>
-            </a:r>
-          </a:p>
-        </p:txBody>
-      </p:sp>
-      <p:sp>
-        <p:nvSpPr>
-          <p:cNvPr id="6" name="TextBox 5">
-            <a:extLst>
-              <a:ext uri="{FF2B5EF4-FFF2-40B4-BE49-F238E27FC236}">
-                <a16:creationId xmlns:a16="http://schemas.microsoft.com/office/drawing/2014/main" id="{4E3B7F5A-3194-7828-C7FB-30CC8CF70FB2}"/>
-              </a:ext>
-            </a:extLst>
-          </p:cNvPr>
-          <p:cNvSpPr txBox="1"/>
-          <p:nvPr/>
-        </p:nvSpPr>
-        <p:spPr>
-          <a:xfrm>
-            <a:off x="2672508" y="3806687"/>
-            <a:ext cx="3302764" cy="923330"/>
-          </a:xfrm>
-          <a:prstGeom prst="rect">
-            <a:avLst/>
-          </a:prstGeom>
-          <a:noFill/>
-        </p:spPr>
-        <p:txBody>
-          <a:bodyPr wrap="none" rtlCol="0">
-            <a:spAutoFit/>
-          </a:bodyPr>
-          <a:lstStyle/>
-          <a:p>
-            <a:pPr marL="285750" indent="-285750">
-              <a:buFont typeface="Arial" panose="020B0604020202020204" pitchFamily="34" charset="0"/>
-              <a:buChar char="•"/>
-            </a:pPr>
-            <a:r>
-              <a:rPr lang="en-US" dirty="0"/>
-              <a:t>Compute or estimate features</a:t>
-            </a:r>
-          </a:p>
-          <a:p>
-            <a:pPr marL="285750" indent="-285750">
-              <a:buFont typeface="Arial" panose="020B0604020202020204" pitchFamily="34" charset="0"/>
-              <a:buChar char="•"/>
-            </a:pPr>
-            <a:r>
-              <a:rPr lang="en-US" dirty="0"/>
-              <a:t>Encode nominal values</a:t>
-            </a:r>
-          </a:p>
-          <a:p>
-            <a:pPr marL="285750" indent="-285750">
-              <a:buFont typeface="Arial" panose="020B0604020202020204" pitchFamily="34" charset="0"/>
-              <a:buChar char="•"/>
-            </a:pPr>
-            <a:r>
-              <a:rPr lang="en-US" dirty="0"/>
-              <a:t>Cross reference for feature</a:t>
-            </a:r>
-          </a:p>
-        </p:txBody>
-      </p:sp>
-      <p:sp>
-        <p:nvSpPr>
-          <p:cNvPr id="7" name="TextBox 6">
-            <a:extLst>
-              <a:ext uri="{FF2B5EF4-FFF2-40B4-BE49-F238E27FC236}">
-                <a16:creationId xmlns:a16="http://schemas.microsoft.com/office/drawing/2014/main" id="{F7E50EBB-5484-1255-C7FC-C4E69CBC5D69}"/>
-              </a:ext>
-            </a:extLst>
-          </p:cNvPr>
-          <p:cNvSpPr txBox="1"/>
-          <p:nvPr/>
-        </p:nvSpPr>
-        <p:spPr>
-          <a:xfrm>
-            <a:off x="6264850" y="3806687"/>
-            <a:ext cx="3094822" cy="923330"/>
-          </a:xfrm>
-          <a:prstGeom prst="rect">
-            <a:avLst/>
-          </a:prstGeom>
-          <a:noFill/>
-        </p:spPr>
-        <p:txBody>
-          <a:bodyPr wrap="none" rtlCol="0">
-            <a:spAutoFit/>
-          </a:bodyPr>
-          <a:lstStyle/>
-          <a:p>
-            <a:pPr marL="285750" indent="-285750">
-              <a:buFont typeface="Arial" panose="020B0604020202020204" pitchFamily="34" charset="0"/>
-              <a:buChar char="•"/>
-            </a:pPr>
-            <a:r>
-              <a:rPr lang="en-US" dirty="0"/>
-              <a:t>Remove redundant features</a:t>
-            </a:r>
-          </a:p>
-          <a:p>
-            <a:pPr marL="285750" indent="-285750">
-              <a:buFont typeface="Arial" panose="020B0604020202020204" pitchFamily="34" charset="0"/>
-              <a:buChar char="•"/>
-            </a:pPr>
-            <a:r>
-              <a:rPr lang="en-US" dirty="0"/>
-              <a:t>Remove inconvenient feats</a:t>
-            </a:r>
-          </a:p>
-          <a:p>
-            <a:pPr marL="285750" indent="-285750">
-              <a:buFont typeface="Arial" panose="020B0604020202020204" pitchFamily="34" charset="0"/>
-              <a:buChar char="•"/>
-            </a:pPr>
-            <a:r>
-              <a:rPr lang="en-US" dirty="0"/>
-              <a:t>Increase interpretability</a:t>
-            </a:r>
-          </a:p>
-        </p:txBody>
-      </p:sp>
-      <p:sp>
-        <p:nvSpPr>
-          <p:cNvPr id="8" name="Left Brace 7">
-            <a:extLst>
-              <a:ext uri="{FF2B5EF4-FFF2-40B4-BE49-F238E27FC236}">
-                <a16:creationId xmlns:a16="http://schemas.microsoft.com/office/drawing/2014/main" id="{307AD408-CC10-30A4-4246-A486532E0E25}"/>
-              </a:ext>
-            </a:extLst>
-          </p:cNvPr>
-          <p:cNvSpPr/>
-          <p:nvPr/>
-        </p:nvSpPr>
-        <p:spPr>
-          <a:xfrm rot="5400000">
-            <a:off x="5976274" y="-753385"/>
-            <a:ext cx="278296" cy="7092563"/>
-          </a:xfrm>
-          <a:prstGeom prst="leftBrace">
-            <a:avLst/>
-          </a:prstGeom>
-          <a:ln w="34925">
-            <a:solidFill>
-              <a:schemeClr val="tx1"/>
-            </a:solidFill>
+            <a:tailEnd type="triangle"/>
           </a:ln>
         </p:spPr>
         <p:style>
@@ -4838,21 +5367,13 @@
             <a:schemeClr val="tx1"/>
           </a:fontRef>
         </p:style>
-        <p:txBody>
-          <a:bodyPr rtlCol="0" anchor="ctr"/>
-          <a:lstStyle/>
-          <a:p>
-            <a:pPr algn="ctr"/>
-            <a:endParaRPr lang="en-US"/>
-          </a:p>
-        </p:txBody>
-      </p:sp>
-      <p:sp>
-        <p:nvSpPr>
-          <p:cNvPr id="9" name="TextBox 8">
-            <a:extLst>
-              <a:ext uri="{FF2B5EF4-FFF2-40B4-BE49-F238E27FC236}">
-                <a16:creationId xmlns:a16="http://schemas.microsoft.com/office/drawing/2014/main" id="{610083A8-C473-C29D-9895-217666340E57}"/>
+      </p:cxnSp>
+      <p:sp>
+        <p:nvSpPr>
+          <p:cNvPr id="7" name="TextBox 6">
+            <a:extLst>
+              <a:ext uri="{FF2B5EF4-FFF2-40B4-BE49-F238E27FC236}">
+                <a16:creationId xmlns:a16="http://schemas.microsoft.com/office/drawing/2014/main" id="{E56BE64A-248C-1D3A-A12F-3106AC73727A}"/>
               </a:ext>
             </a:extLst>
           </p:cNvPr>
@@ -4861,8 +5382,8 @@
         </p:nvSpPr>
         <p:spPr>
           <a:xfrm>
-            <a:off x="4552385" y="2070894"/>
-            <a:ext cx="3446777" cy="523220"/>
+            <a:off x="7020877" y="2060870"/>
+            <a:ext cx="853119" cy="461665"/>
           </a:xfrm>
           <a:prstGeom prst="rect">
             <a:avLst/>
@@ -4876,19 +5397,150 @@
           <a:lstStyle/>
           <a:p>
             <a:r>
-              <a:rPr lang="en-US" sz="2800" dirty="0">
+              <a:rPr lang="en-US" sz="2400" b="1" dirty="0">
                 <a:latin typeface="Arial" panose="020B0604020202020204" pitchFamily="34" charset="0"/>
                 <a:cs typeface="Arial" panose="020B0604020202020204" pitchFamily="34" charset="0"/>
               </a:rPr>
-              <a:t>Feature Engineering</a:t>
+              <a:t>KNN</a:t>
             </a:r>
+          </a:p>
+        </p:txBody>
+      </p:sp>
+      <p:cxnSp>
+        <p:nvCxnSpPr>
+          <p:cNvPr id="8" name="Straight Arrow Connector 7">
+            <a:extLst>
+              <a:ext uri="{FF2B5EF4-FFF2-40B4-BE49-F238E27FC236}">
+                <a16:creationId xmlns:a16="http://schemas.microsoft.com/office/drawing/2014/main" id="{392CC2D6-2C20-7E7E-7860-B5393F552ED6}"/>
+              </a:ext>
+            </a:extLst>
+          </p:cNvPr>
+          <p:cNvCxnSpPr>
+            <a:cxnSpLocks/>
+          </p:cNvCxnSpPr>
+          <p:nvPr/>
+        </p:nvCxnSpPr>
+        <p:spPr>
+          <a:xfrm flipH="1" flipV="1">
+            <a:off x="5754814" y="3428998"/>
+            <a:ext cx="1560386" cy="385764"/>
+          </a:xfrm>
+          <a:prstGeom prst="straightConnector1">
+            <a:avLst/>
+          </a:prstGeom>
+          <a:ln w="31750">
+            <a:solidFill>
+              <a:schemeClr val="accent2"/>
+            </a:solidFill>
+            <a:tailEnd type="triangle"/>
+          </a:ln>
+        </p:spPr>
+        <p:style>
+          <a:lnRef idx="1">
+            <a:schemeClr val="accent1"/>
+          </a:lnRef>
+          <a:fillRef idx="0">
+            <a:schemeClr val="accent1"/>
+          </a:fillRef>
+          <a:effectRef idx="0">
+            <a:schemeClr val="accent1"/>
+          </a:effectRef>
+          <a:fontRef idx="minor">
+            <a:schemeClr val="tx1"/>
+          </a:fontRef>
+        </p:style>
+      </p:cxnSp>
+      <p:sp>
+        <p:nvSpPr>
+          <p:cNvPr id="10" name="TextBox 9">
+            <a:extLst>
+              <a:ext uri="{FF2B5EF4-FFF2-40B4-BE49-F238E27FC236}">
+                <a16:creationId xmlns:a16="http://schemas.microsoft.com/office/drawing/2014/main" id="{3BD93877-6DC1-93F7-6BAF-A69728F8F9CD}"/>
+              </a:ext>
+            </a:extLst>
+          </p:cNvPr>
+          <p:cNvSpPr txBox="1"/>
+          <p:nvPr/>
+        </p:nvSpPr>
+        <p:spPr>
+          <a:xfrm>
+            <a:off x="7438619" y="3621880"/>
+            <a:ext cx="3910418" cy="1938992"/>
+          </a:xfrm>
+          <a:prstGeom prst="rect">
+            <a:avLst/>
+          </a:prstGeom>
+          <a:noFill/>
+        </p:spPr>
+        <p:txBody>
+          <a:bodyPr wrap="square" rtlCol="0">
+            <a:spAutoFit/>
+          </a:bodyPr>
+          <a:lstStyle/>
+          <a:p>
+            <a:r>
+              <a:rPr lang="en-US" sz="2400" b="1" dirty="0">
+                <a:latin typeface="Arial" panose="020B0604020202020204" pitchFamily="34" charset="0"/>
+                <a:cs typeface="Arial" panose="020B0604020202020204" pitchFamily="34" charset="0"/>
+              </a:rPr>
+              <a:t>Features:</a:t>
+            </a:r>
+          </a:p>
+          <a:p>
+            <a:pPr marL="342900" indent="-342900">
+              <a:buFontTx/>
+              <a:buChar char="-"/>
+            </a:pPr>
+            <a:r>
+              <a:rPr lang="en-US" sz="2400" dirty="0">
+                <a:latin typeface="Arial" panose="020B0604020202020204" pitchFamily="34" charset="0"/>
+                <a:cs typeface="Arial" panose="020B0604020202020204" pitchFamily="34" charset="0"/>
+              </a:rPr>
+              <a:t>QAS ratio</a:t>
+            </a:r>
+          </a:p>
+          <a:p>
+            <a:pPr marL="342900" indent="-342900">
+              <a:buFontTx/>
+              <a:buChar char="-"/>
+            </a:pPr>
+            <a:r>
+              <a:rPr lang="en-US" sz="2400" dirty="0">
+                <a:latin typeface="Arial" panose="020B0604020202020204" pitchFamily="34" charset="0"/>
+                <a:cs typeface="Arial" panose="020B0604020202020204" pitchFamily="34" charset="0"/>
+              </a:rPr>
+              <a:t>HBD (OneHot encoded)</a:t>
+            </a:r>
+          </a:p>
+          <a:p>
+            <a:pPr marL="342900" indent="-342900">
+              <a:buFontTx/>
+              <a:buChar char="-"/>
+            </a:pPr>
+            <a:r>
+              <a:rPr lang="en-US" sz="2400" dirty="0">
+                <a:latin typeface="Arial" panose="020B0604020202020204" pitchFamily="34" charset="0"/>
+                <a:cs typeface="Arial" panose="020B0604020202020204" pitchFamily="34" charset="0"/>
+              </a:rPr>
+              <a:t>QAS (OneHot encoded)</a:t>
+            </a:r>
+          </a:p>
+          <a:p>
+            <a:pPr marL="342900" indent="-342900">
+              <a:buFontTx/>
+              <a:buChar char="-"/>
+            </a:pPr>
+            <a:endParaRPr lang="en-US" sz="2400" dirty="0">
+              <a:latin typeface="Arial" panose="020B0604020202020204" pitchFamily="34" charset="0"/>
+              <a:cs typeface="Arial" panose="020B0604020202020204" pitchFamily="34" charset="0"/>
+            </a:endParaRPr>
           </a:p>
         </p:txBody>
       </p:sp>
     </p:spTree>
     <p:extLst>
       <p:ext uri="{BB962C8B-B14F-4D97-AF65-F5344CB8AC3E}">
-        <p14:creationId xmlns:p14="http://schemas.microsoft.com/office/powerpoint/2010/main" val="828967740"/>
+        <p14:creationId xmlns:p14="http://schemas.microsoft.com/office/powerpoint/2010/main" val="1929043888"/>
       </p:ext>
     </p:extLst>
   </p:cSld>
@@ -4915,87 +5567,365 @@
           <a:chExt cx="0" cy="0"/>
         </a:xfrm>
       </p:grpSpPr>
-      <p:pic>
-        <p:nvPicPr>
-          <p:cNvPr id="1026" name="Picture 2" descr="Benzoyl chloride - Wikipedia">
-            <a:extLst>
-              <a:ext uri="{FF2B5EF4-FFF2-40B4-BE49-F238E27FC236}">
-                <a16:creationId xmlns:a16="http://schemas.microsoft.com/office/drawing/2014/main" id="{FB526F1B-8C2F-69CD-1A84-67617FF1270E}"/>
-              </a:ext>
-            </a:extLst>
-          </p:cNvPr>
-          <p:cNvPicPr>
-            <a:picLocks noChangeAspect="1" noChangeArrowheads="1"/>
-          </p:cNvPicPr>
-          <p:nvPr/>
-        </p:nvPicPr>
-        <p:blipFill>
-          <a:blip r:embed="rId2">
-            <a:extLst>
-              <a:ext uri="{28A0092B-C50C-407E-A947-70E740481C1C}">
-                <a14:useLocalDpi xmlns:a14="http://schemas.microsoft.com/office/drawing/2010/main" val="0"/>
-              </a:ext>
-            </a:extLst>
-          </a:blip>
-          <a:srcRect/>
-          <a:stretch>
-            <a:fillRect/>
-          </a:stretch>
-        </p:blipFill>
-        <p:spPr bwMode="auto">
-          <a:xfrm>
-            <a:off x="4520973" y="422483"/>
-            <a:ext cx="3150054" cy="2711884"/>
+      <p:sp>
+        <p:nvSpPr>
+          <p:cNvPr id="4" name="Rectangle 3">
+            <a:extLst>
+              <a:ext uri="{FF2B5EF4-FFF2-40B4-BE49-F238E27FC236}">
+                <a16:creationId xmlns:a16="http://schemas.microsoft.com/office/drawing/2014/main" id="{3BFD8038-4CE5-A164-57BB-E096AE82647B}"/>
+              </a:ext>
+            </a:extLst>
+          </p:cNvPr>
+          <p:cNvSpPr/>
+          <p:nvPr/>
+        </p:nvSpPr>
+        <p:spPr>
+          <a:xfrm>
+            <a:off x="2672508" y="3051313"/>
+            <a:ext cx="3291840" cy="755374"/>
           </a:xfrm>
           <a:prstGeom prst="rect">
             <a:avLst/>
           </a:prstGeom>
+          <a:solidFill>
+            <a:schemeClr val="accent1">
+              <a:lumMod val="40000"/>
+              <a:lumOff val="60000"/>
+            </a:schemeClr>
+          </a:solidFill>
+          <a:ln w="38100"/>
+        </p:spPr>
+        <p:style>
+          <a:lnRef idx="2">
+            <a:schemeClr val="accent1">
+              <a:shade val="50000"/>
+            </a:schemeClr>
+          </a:lnRef>
+          <a:fillRef idx="1">
+            <a:schemeClr val="accent1"/>
+          </a:fillRef>
+          <a:effectRef idx="0">
+            <a:schemeClr val="accent1"/>
+          </a:effectRef>
+          <a:fontRef idx="minor">
+            <a:schemeClr val="lt1"/>
+          </a:fontRef>
+        </p:style>
+        <p:txBody>
+          <a:bodyPr rtlCol="0" anchor="ctr"/>
+          <a:lstStyle/>
+          <a:p>
+            <a:pPr algn="ctr"/>
+            <a:r>
+              <a:rPr lang="en-US" sz="2800" dirty="0">
+                <a:solidFill>
+                  <a:schemeClr val="tx1"/>
+                </a:solidFill>
+                <a:latin typeface="Arial" panose="020B0604020202020204" pitchFamily="34" charset="0"/>
+                <a:cs typeface="Arial" panose="020B0604020202020204" pitchFamily="34" charset="0"/>
+              </a:rPr>
+              <a:t>Feature </a:t>
+            </a:r>
+            <a:r>
+              <a:rPr lang="en-US" sz="2800" b="1" dirty="0">
+                <a:solidFill>
+                  <a:schemeClr val="tx1"/>
+                </a:solidFill>
+                <a:latin typeface="Arial" panose="020B0604020202020204" pitchFamily="34" charset="0"/>
+                <a:cs typeface="Arial" panose="020B0604020202020204" pitchFamily="34" charset="0"/>
+              </a:rPr>
+              <a:t>Extraction</a:t>
+            </a:r>
+          </a:p>
+        </p:txBody>
+      </p:sp>
+      <p:sp>
+        <p:nvSpPr>
+          <p:cNvPr id="5" name="Rectangle 4">
+            <a:extLst>
+              <a:ext uri="{FF2B5EF4-FFF2-40B4-BE49-F238E27FC236}">
+                <a16:creationId xmlns:a16="http://schemas.microsoft.com/office/drawing/2014/main" id="{8194E040-DF4C-3072-615B-0E0453CB2CF4}"/>
+              </a:ext>
+            </a:extLst>
+          </p:cNvPr>
+          <p:cNvSpPr/>
+          <p:nvPr/>
+        </p:nvSpPr>
+        <p:spPr>
+          <a:xfrm>
+            <a:off x="6275774" y="3051313"/>
+            <a:ext cx="3291840" cy="755374"/>
+          </a:xfrm>
+          <a:prstGeom prst="rect">
+            <a:avLst/>
+          </a:prstGeom>
+          <a:solidFill>
+            <a:schemeClr val="accent2">
+              <a:lumMod val="20000"/>
+              <a:lumOff val="80000"/>
+            </a:schemeClr>
+          </a:solidFill>
+          <a:ln w="38100">
+            <a:solidFill>
+              <a:schemeClr val="accent2">
+                <a:lumMod val="50000"/>
+              </a:schemeClr>
+            </a:solidFill>
+          </a:ln>
+        </p:spPr>
+        <p:style>
+          <a:lnRef idx="2">
+            <a:schemeClr val="accent1">
+              <a:shade val="50000"/>
+            </a:schemeClr>
+          </a:lnRef>
+          <a:fillRef idx="1">
+            <a:schemeClr val="accent1"/>
+          </a:fillRef>
+          <a:effectRef idx="0">
+            <a:schemeClr val="accent1"/>
+          </a:effectRef>
+          <a:fontRef idx="minor">
+            <a:schemeClr val="lt1"/>
+          </a:fontRef>
+        </p:style>
+        <p:txBody>
+          <a:bodyPr rtlCol="0" anchor="ctr"/>
+          <a:lstStyle/>
+          <a:p>
+            <a:pPr algn="ctr"/>
+            <a:r>
+              <a:rPr lang="en-US" sz="2800" dirty="0">
+                <a:solidFill>
+                  <a:schemeClr val="tx1"/>
+                </a:solidFill>
+                <a:latin typeface="Arial" panose="020B0604020202020204" pitchFamily="34" charset="0"/>
+                <a:cs typeface="Arial" panose="020B0604020202020204" pitchFamily="34" charset="0"/>
+              </a:rPr>
+              <a:t>Feature </a:t>
+            </a:r>
+            <a:r>
+              <a:rPr lang="en-US" sz="2800" b="1" dirty="0">
+                <a:solidFill>
+                  <a:schemeClr val="tx1"/>
+                </a:solidFill>
+                <a:latin typeface="Arial" panose="020B0604020202020204" pitchFamily="34" charset="0"/>
+                <a:cs typeface="Arial" panose="020B0604020202020204" pitchFamily="34" charset="0"/>
+              </a:rPr>
+              <a:t>Selection</a:t>
+            </a:r>
+          </a:p>
+        </p:txBody>
+      </p:sp>
+      <p:sp>
+        <p:nvSpPr>
+          <p:cNvPr id="6" name="TextBox 5">
+            <a:extLst>
+              <a:ext uri="{FF2B5EF4-FFF2-40B4-BE49-F238E27FC236}">
+                <a16:creationId xmlns:a16="http://schemas.microsoft.com/office/drawing/2014/main" id="{4E3B7F5A-3194-7828-C7FB-30CC8CF70FB2}"/>
+              </a:ext>
+            </a:extLst>
+          </p:cNvPr>
+          <p:cNvSpPr txBox="1"/>
+          <p:nvPr/>
+        </p:nvSpPr>
+        <p:spPr>
+          <a:xfrm>
+            <a:off x="2672508" y="3806687"/>
+            <a:ext cx="3302764" cy="923330"/>
+          </a:xfrm>
+          <a:prstGeom prst="rect">
+            <a:avLst/>
+          </a:prstGeom>
           <a:noFill/>
-          <a:extLst>
-            <a:ext uri="{909E8E84-426E-40DD-AFC4-6F175D3DCCD1}">
-              <a14:hiddenFill xmlns:a14="http://schemas.microsoft.com/office/drawing/2010/main">
-                <a:solidFill>
-                  <a:srgbClr val="FFFFFF"/>
-                </a:solidFill>
-              </a14:hiddenFill>
-            </a:ext>
-          </a:extLst>
-        </p:spPr>
-      </p:pic>
-      <p:pic>
-        <p:nvPicPr>
-          <p:cNvPr id="4" name="Picture 3">
-            <a:extLst>
-              <a:ext uri="{FF2B5EF4-FFF2-40B4-BE49-F238E27FC236}">
-                <a16:creationId xmlns:a16="http://schemas.microsoft.com/office/drawing/2014/main" id="{39E7DA2C-FEB6-CEAB-9215-8FE706C07CE2}"/>
-              </a:ext>
-            </a:extLst>
-          </p:cNvPr>
-          <p:cNvPicPr>
-            <a:picLocks noChangeAspect="1"/>
-          </p:cNvPicPr>
-          <p:nvPr/>
-        </p:nvPicPr>
-        <p:blipFill>
-          <a:blip r:embed="rId3"/>
-          <a:stretch>
-            <a:fillRect/>
-          </a:stretch>
-        </p:blipFill>
-        <p:spPr>
-          <a:xfrm>
-            <a:off x="4049775" y="4263697"/>
-            <a:ext cx="3568700" cy="558800"/>
+        </p:spPr>
+        <p:txBody>
+          <a:bodyPr wrap="none" rtlCol="0">
+            <a:spAutoFit/>
+          </a:bodyPr>
+          <a:lstStyle/>
+          <a:p>
+            <a:pPr marL="285750" indent="-285750">
+              <a:buFont typeface="Arial" panose="020B0604020202020204" pitchFamily="34" charset="0"/>
+              <a:buChar char="•"/>
+            </a:pPr>
+            <a:r>
+              <a:rPr lang="en-US" dirty="0"/>
+              <a:t>Compute or estimate features</a:t>
+            </a:r>
+          </a:p>
+          <a:p>
+            <a:pPr marL="285750" indent="-285750">
+              <a:buFont typeface="Arial" panose="020B0604020202020204" pitchFamily="34" charset="0"/>
+              <a:buChar char="•"/>
+            </a:pPr>
+            <a:r>
+              <a:rPr lang="en-US" dirty="0"/>
+              <a:t>Encode nominal values</a:t>
+            </a:r>
+          </a:p>
+          <a:p>
+            <a:pPr marL="285750" indent="-285750">
+              <a:buFont typeface="Arial" panose="020B0604020202020204" pitchFamily="34" charset="0"/>
+              <a:buChar char="•"/>
+            </a:pPr>
+            <a:r>
+              <a:rPr lang="en-US" dirty="0"/>
+              <a:t>Cross reference for feature</a:t>
+            </a:r>
+          </a:p>
+        </p:txBody>
+      </p:sp>
+      <p:sp>
+        <p:nvSpPr>
+          <p:cNvPr id="7" name="TextBox 6">
+            <a:extLst>
+              <a:ext uri="{FF2B5EF4-FFF2-40B4-BE49-F238E27FC236}">
+                <a16:creationId xmlns:a16="http://schemas.microsoft.com/office/drawing/2014/main" id="{F7E50EBB-5484-1255-C7FC-C4E69CBC5D69}"/>
+              </a:ext>
+            </a:extLst>
+          </p:cNvPr>
+          <p:cNvSpPr txBox="1"/>
+          <p:nvPr/>
+        </p:nvSpPr>
+        <p:spPr>
+          <a:xfrm>
+            <a:off x="6264850" y="3806687"/>
+            <a:ext cx="3094822" cy="923330"/>
           </a:xfrm>
           <a:prstGeom prst="rect">
             <a:avLst/>
           </a:prstGeom>
-        </p:spPr>
-      </p:pic>
+          <a:noFill/>
+        </p:spPr>
+        <p:txBody>
+          <a:bodyPr wrap="none" rtlCol="0">
+            <a:spAutoFit/>
+          </a:bodyPr>
+          <a:lstStyle/>
+          <a:p>
+            <a:pPr marL="285750" indent="-285750">
+              <a:buFont typeface="Arial" panose="020B0604020202020204" pitchFamily="34" charset="0"/>
+              <a:buChar char="•"/>
+            </a:pPr>
+            <a:r>
+              <a:rPr lang="en-US" dirty="0"/>
+              <a:t>Remove redundant features</a:t>
+            </a:r>
+          </a:p>
+          <a:p>
+            <a:pPr marL="285750" indent="-285750">
+              <a:buFont typeface="Arial" panose="020B0604020202020204" pitchFamily="34" charset="0"/>
+              <a:buChar char="•"/>
+            </a:pPr>
+            <a:r>
+              <a:rPr lang="en-US" dirty="0"/>
+              <a:t>Remove inconvenient feats</a:t>
+            </a:r>
+          </a:p>
+          <a:p>
+            <a:pPr marL="285750" indent="-285750">
+              <a:buFont typeface="Arial" panose="020B0604020202020204" pitchFamily="34" charset="0"/>
+              <a:buChar char="•"/>
+            </a:pPr>
+            <a:r>
+              <a:rPr lang="en-US" dirty="0"/>
+              <a:t>Increase interpretability</a:t>
+            </a:r>
+          </a:p>
+        </p:txBody>
+      </p:sp>
+      <p:sp>
+        <p:nvSpPr>
+          <p:cNvPr id="8" name="Left Brace 7">
+            <a:extLst>
+              <a:ext uri="{FF2B5EF4-FFF2-40B4-BE49-F238E27FC236}">
+                <a16:creationId xmlns:a16="http://schemas.microsoft.com/office/drawing/2014/main" id="{307AD408-CC10-30A4-4246-A486532E0E25}"/>
+              </a:ext>
+            </a:extLst>
+          </p:cNvPr>
+          <p:cNvSpPr/>
+          <p:nvPr/>
+        </p:nvSpPr>
+        <p:spPr>
+          <a:xfrm rot="5400000">
+            <a:off x="5976274" y="-753385"/>
+            <a:ext cx="278296" cy="7092563"/>
+          </a:xfrm>
+          <a:prstGeom prst="leftBrace">
+            <a:avLst/>
+          </a:prstGeom>
+          <a:ln w="34925">
+            <a:solidFill>
+              <a:schemeClr val="tx1"/>
+            </a:solidFill>
+          </a:ln>
+        </p:spPr>
+        <p:style>
+          <a:lnRef idx="1">
+            <a:schemeClr val="accent1"/>
+          </a:lnRef>
+          <a:fillRef idx="0">
+            <a:schemeClr val="accent1"/>
+          </a:fillRef>
+          <a:effectRef idx="0">
+            <a:schemeClr val="accent1"/>
+          </a:effectRef>
+          <a:fontRef idx="minor">
+            <a:schemeClr val="tx1"/>
+          </a:fontRef>
+        </p:style>
+        <p:txBody>
+          <a:bodyPr rtlCol="0" anchor="ctr"/>
+          <a:lstStyle/>
+          <a:p>
+            <a:pPr algn="ctr"/>
+            <a:endParaRPr lang="en-US"/>
+          </a:p>
+        </p:txBody>
+      </p:sp>
+      <p:sp>
+        <p:nvSpPr>
+          <p:cNvPr id="9" name="TextBox 8">
+            <a:extLst>
+              <a:ext uri="{FF2B5EF4-FFF2-40B4-BE49-F238E27FC236}">
+                <a16:creationId xmlns:a16="http://schemas.microsoft.com/office/drawing/2014/main" id="{610083A8-C473-C29D-9895-217666340E57}"/>
+              </a:ext>
+            </a:extLst>
+          </p:cNvPr>
+          <p:cNvSpPr txBox="1"/>
+          <p:nvPr/>
+        </p:nvSpPr>
+        <p:spPr>
+          <a:xfrm>
+            <a:off x="4552385" y="2070894"/>
+            <a:ext cx="3446777" cy="523220"/>
+          </a:xfrm>
+          <a:prstGeom prst="rect">
+            <a:avLst/>
+          </a:prstGeom>
+          <a:noFill/>
+        </p:spPr>
+        <p:txBody>
+          <a:bodyPr wrap="none" rtlCol="0">
+            <a:spAutoFit/>
+          </a:bodyPr>
+          <a:lstStyle/>
+          <a:p>
+            <a:r>
+              <a:rPr lang="en-US" sz="2800" dirty="0">
+                <a:latin typeface="Arial" panose="020B0604020202020204" pitchFamily="34" charset="0"/>
+                <a:cs typeface="Arial" panose="020B0604020202020204" pitchFamily="34" charset="0"/>
+              </a:rPr>
+              <a:t>Feature Engineering</a:t>
+            </a:r>
+          </a:p>
+        </p:txBody>
+      </p:sp>
     </p:spTree>
     <p:extLst>
       <p:ext uri="{BB962C8B-B14F-4D97-AF65-F5344CB8AC3E}">
-        <p14:creationId xmlns:p14="http://schemas.microsoft.com/office/powerpoint/2010/main" val="1395397786"/>
+        <p14:creationId xmlns:p14="http://schemas.microsoft.com/office/powerpoint/2010/main" val="828967740"/>
       </p:ext>
     </p:extLst>
   </p:cSld>
@@ -5024,199 +5954,57 @@
       </p:grpSpPr>
       <p:pic>
         <p:nvPicPr>
-          <p:cNvPr id="6" name="Picture 5">
-            <a:extLst>
-              <a:ext uri="{FF2B5EF4-FFF2-40B4-BE49-F238E27FC236}">
-                <a16:creationId xmlns:a16="http://schemas.microsoft.com/office/drawing/2014/main" id="{C5F70845-FCAE-C155-2C08-0BCF04284E25}"/>
+          <p:cNvPr id="1026" name="Picture 2" descr="Benzoyl chloride - Wikipedia">
+            <a:extLst>
+              <a:ext uri="{FF2B5EF4-FFF2-40B4-BE49-F238E27FC236}">
+                <a16:creationId xmlns:a16="http://schemas.microsoft.com/office/drawing/2014/main" id="{FB526F1B-8C2F-69CD-1A84-67617FF1270E}"/>
               </a:ext>
             </a:extLst>
           </p:cNvPr>
           <p:cNvPicPr>
-            <a:picLocks noChangeAspect="1"/>
+            <a:picLocks noChangeAspect="1" noChangeArrowheads="1"/>
           </p:cNvPicPr>
           <p:nvPr/>
         </p:nvPicPr>
         <p:blipFill>
-          <a:blip r:embed="rId2"/>
+          <a:blip r:embed="rId2">
+            <a:extLst>
+              <a:ext uri="{28A0092B-C50C-407E-A947-70E740481C1C}">
+                <a14:useLocalDpi xmlns:a14="http://schemas.microsoft.com/office/drawing/2010/main" val="0"/>
+              </a:ext>
+            </a:extLst>
+          </a:blip>
+          <a:srcRect/>
           <a:stretch>
             <a:fillRect/>
           </a:stretch>
         </p:blipFill>
-        <p:spPr>
-          <a:xfrm>
-            <a:off x="2451538" y="1860331"/>
-            <a:ext cx="5887392" cy="3439941"/>
+        <p:spPr bwMode="auto">
+          <a:xfrm>
+            <a:off x="4520973" y="422483"/>
+            <a:ext cx="3150054" cy="2711884"/>
           </a:xfrm>
           <a:prstGeom prst="rect">
             <a:avLst/>
           </a:prstGeom>
+          <a:noFill/>
+          <a:extLst>
+            <a:ext uri="{909E8E84-426E-40DD-AFC4-6F175D3DCCD1}">
+              <a14:hiddenFill xmlns:a14="http://schemas.microsoft.com/office/drawing/2010/main">
+                <a:solidFill>
+                  <a:srgbClr val="FFFFFF"/>
+                </a:solidFill>
+              </a14:hiddenFill>
+            </a:ext>
+          </a:extLst>
         </p:spPr>
       </p:pic>
-      <p:sp>
-        <p:nvSpPr>
-          <p:cNvPr id="7" name="Rectangle 6">
-            <a:extLst>
-              <a:ext uri="{FF2B5EF4-FFF2-40B4-BE49-F238E27FC236}">
-                <a16:creationId xmlns:a16="http://schemas.microsoft.com/office/drawing/2014/main" id="{C57775F4-A4D4-7953-30D7-4A4D12743804}"/>
-              </a:ext>
-            </a:extLst>
-          </p:cNvPr>
-          <p:cNvSpPr/>
-          <p:nvPr/>
-        </p:nvSpPr>
-        <p:spPr>
-          <a:xfrm>
-            <a:off x="4372303" y="4918841"/>
-            <a:ext cx="2049518" cy="210207"/>
-          </a:xfrm>
-          <a:prstGeom prst="rect">
-            <a:avLst/>
-          </a:prstGeom>
-          <a:solidFill>
-            <a:schemeClr val="bg1"/>
-          </a:solidFill>
-          <a:ln>
-            <a:noFill/>
-          </a:ln>
-        </p:spPr>
-        <p:style>
-          <a:lnRef idx="2">
-            <a:schemeClr val="accent1">
-              <a:shade val="50000"/>
-            </a:schemeClr>
-          </a:lnRef>
-          <a:fillRef idx="1">
-            <a:schemeClr val="accent1"/>
-          </a:fillRef>
-          <a:effectRef idx="0">
-            <a:schemeClr val="accent1"/>
-          </a:effectRef>
-          <a:fontRef idx="minor">
-            <a:schemeClr val="lt1"/>
-          </a:fontRef>
-        </p:style>
-        <p:txBody>
-          <a:bodyPr rtlCol="0" anchor="ctr"/>
-          <a:lstStyle/>
-          <a:p>
-            <a:pPr algn="ctr"/>
-            <a:endParaRPr lang="en-US"/>
-          </a:p>
-        </p:txBody>
-      </p:sp>
-      <p:sp>
-        <p:nvSpPr>
-          <p:cNvPr id="8" name="Rectangle 7">
-            <a:extLst>
-              <a:ext uri="{FF2B5EF4-FFF2-40B4-BE49-F238E27FC236}">
-                <a16:creationId xmlns:a16="http://schemas.microsoft.com/office/drawing/2014/main" id="{324FCBCA-D74F-C955-ABAB-10F249843B71}"/>
-              </a:ext>
-            </a:extLst>
-          </p:cNvPr>
-          <p:cNvSpPr/>
-          <p:nvPr/>
-        </p:nvSpPr>
-        <p:spPr>
-          <a:xfrm>
-            <a:off x="6647793" y="4377558"/>
-            <a:ext cx="2049518" cy="210207"/>
-          </a:xfrm>
-          <a:prstGeom prst="rect">
-            <a:avLst/>
-          </a:prstGeom>
-          <a:solidFill>
-            <a:schemeClr val="bg1"/>
-          </a:solidFill>
-          <a:ln>
-            <a:noFill/>
-          </a:ln>
-        </p:spPr>
-        <p:style>
-          <a:lnRef idx="2">
-            <a:schemeClr val="accent1">
-              <a:shade val="50000"/>
-            </a:schemeClr>
-          </a:lnRef>
-          <a:fillRef idx="1">
-            <a:schemeClr val="accent1"/>
-          </a:fillRef>
-          <a:effectRef idx="0">
-            <a:schemeClr val="accent1"/>
-          </a:effectRef>
-          <a:fontRef idx="minor">
-            <a:schemeClr val="lt1"/>
-          </a:fontRef>
-        </p:style>
-        <p:txBody>
-          <a:bodyPr rtlCol="0" anchor="ctr"/>
-          <a:lstStyle/>
-          <a:p>
-            <a:pPr algn="ctr"/>
-            <a:r>
-              <a:rPr lang="en-US" dirty="0"/>
-              <a:t>v</a:t>
-            </a:r>
-          </a:p>
-        </p:txBody>
-      </p:sp>
-      <p:sp>
-        <p:nvSpPr>
-          <p:cNvPr id="9" name="Rectangle 8">
-            <a:extLst>
-              <a:ext uri="{FF2B5EF4-FFF2-40B4-BE49-F238E27FC236}">
-                <a16:creationId xmlns:a16="http://schemas.microsoft.com/office/drawing/2014/main" id="{7CA72A5D-2C23-5671-3128-81AB8C87AF87}"/>
-              </a:ext>
-            </a:extLst>
-          </p:cNvPr>
-          <p:cNvSpPr/>
-          <p:nvPr/>
-        </p:nvSpPr>
-        <p:spPr>
-          <a:xfrm>
-            <a:off x="6127531" y="2180896"/>
-            <a:ext cx="2049518" cy="210207"/>
-          </a:xfrm>
-          <a:prstGeom prst="rect">
-            <a:avLst/>
-          </a:prstGeom>
-          <a:solidFill>
-            <a:schemeClr val="bg1"/>
-          </a:solidFill>
-          <a:ln>
-            <a:noFill/>
-          </a:ln>
-        </p:spPr>
-        <p:style>
-          <a:lnRef idx="2">
-            <a:schemeClr val="accent1">
-              <a:shade val="50000"/>
-            </a:schemeClr>
-          </a:lnRef>
-          <a:fillRef idx="1">
-            <a:schemeClr val="accent1"/>
-          </a:fillRef>
-          <a:effectRef idx="0">
-            <a:schemeClr val="accent1"/>
-          </a:effectRef>
-          <a:fontRef idx="minor">
-            <a:schemeClr val="lt1"/>
-          </a:fontRef>
-        </p:style>
-        <p:txBody>
-          <a:bodyPr rtlCol="0" anchor="ctr"/>
-          <a:lstStyle/>
-          <a:p>
-            <a:pPr algn="ctr"/>
-            <a:endParaRPr lang="en-US"/>
-          </a:p>
-        </p:txBody>
-      </p:sp>
       <p:pic>
         <p:nvPicPr>
-          <p:cNvPr id="10" name="Picture 9">
-            <a:extLst>
-              <a:ext uri="{FF2B5EF4-FFF2-40B4-BE49-F238E27FC236}">
-                <a16:creationId xmlns:a16="http://schemas.microsoft.com/office/drawing/2014/main" id="{C028B277-52BE-CD6F-7CD6-4D767D3BB6E5}"/>
+          <p:cNvPr id="4" name="Picture 3">
+            <a:extLst>
+              <a:ext uri="{FF2B5EF4-FFF2-40B4-BE49-F238E27FC236}">
+                <a16:creationId xmlns:a16="http://schemas.microsoft.com/office/drawing/2014/main" id="{39E7DA2C-FEB6-CEAB-9215-8FE706C07CE2}"/>
               </a:ext>
             </a:extLst>
           </p:cNvPr>
@@ -5233,38 +6021,8 @@
         </p:blipFill>
         <p:spPr>
           <a:xfrm>
-            <a:off x="6127531" y="2137059"/>
-            <a:ext cx="1902372" cy="297880"/>
-          </a:xfrm>
-          <a:prstGeom prst="rect">
-            <a:avLst/>
-          </a:prstGeom>
-        </p:spPr>
-      </p:pic>
-      <p:pic>
-        <p:nvPicPr>
-          <p:cNvPr id="11" name="Picture 10">
-            <a:extLst>
-              <a:ext uri="{FF2B5EF4-FFF2-40B4-BE49-F238E27FC236}">
-                <a16:creationId xmlns:a16="http://schemas.microsoft.com/office/drawing/2014/main" id="{0C34985F-AA23-2E77-3033-EAD076D245FB}"/>
-              </a:ext>
-            </a:extLst>
-          </p:cNvPr>
-          <p:cNvPicPr>
-            <a:picLocks noChangeAspect="1"/>
-          </p:cNvPicPr>
-          <p:nvPr/>
-        </p:nvPicPr>
-        <p:blipFill>
-          <a:blip r:embed="rId4"/>
-          <a:stretch>
-            <a:fillRect/>
-          </a:stretch>
-        </p:blipFill>
-        <p:spPr>
-          <a:xfrm>
-            <a:off x="5084492" y="4971392"/>
-            <a:ext cx="310742" cy="210208"/>
+            <a:off x="4049775" y="4263697"/>
+            <a:ext cx="3568700" cy="558800"/>
           </a:xfrm>
           <a:prstGeom prst="rect">
             <a:avLst/>
@@ -5274,7 +6032,7 @@
     </p:spTree>
     <p:extLst>
       <p:ext uri="{BB962C8B-B14F-4D97-AF65-F5344CB8AC3E}">
-        <p14:creationId xmlns:p14="http://schemas.microsoft.com/office/powerpoint/2010/main" val="1517495630"/>
+        <p14:creationId xmlns:p14="http://schemas.microsoft.com/office/powerpoint/2010/main" val="1395397786"/>
       </p:ext>
     </p:extLst>
   </p:cSld>
@@ -5303,6 +6061,285 @@
       </p:grpSpPr>
       <p:pic>
         <p:nvPicPr>
+          <p:cNvPr id="6" name="Picture 5">
+            <a:extLst>
+              <a:ext uri="{FF2B5EF4-FFF2-40B4-BE49-F238E27FC236}">
+                <a16:creationId xmlns:a16="http://schemas.microsoft.com/office/drawing/2014/main" id="{C5F70845-FCAE-C155-2C08-0BCF04284E25}"/>
+              </a:ext>
+            </a:extLst>
+          </p:cNvPr>
+          <p:cNvPicPr>
+            <a:picLocks noChangeAspect="1"/>
+          </p:cNvPicPr>
+          <p:nvPr/>
+        </p:nvPicPr>
+        <p:blipFill>
+          <a:blip r:embed="rId2"/>
+          <a:stretch>
+            <a:fillRect/>
+          </a:stretch>
+        </p:blipFill>
+        <p:spPr>
+          <a:xfrm>
+            <a:off x="2451538" y="1860331"/>
+            <a:ext cx="5887392" cy="3439941"/>
+          </a:xfrm>
+          <a:prstGeom prst="rect">
+            <a:avLst/>
+          </a:prstGeom>
+        </p:spPr>
+      </p:pic>
+      <p:sp>
+        <p:nvSpPr>
+          <p:cNvPr id="7" name="Rectangle 6">
+            <a:extLst>
+              <a:ext uri="{FF2B5EF4-FFF2-40B4-BE49-F238E27FC236}">
+                <a16:creationId xmlns:a16="http://schemas.microsoft.com/office/drawing/2014/main" id="{C57775F4-A4D4-7953-30D7-4A4D12743804}"/>
+              </a:ext>
+            </a:extLst>
+          </p:cNvPr>
+          <p:cNvSpPr/>
+          <p:nvPr/>
+        </p:nvSpPr>
+        <p:spPr>
+          <a:xfrm>
+            <a:off x="4372303" y="4918841"/>
+            <a:ext cx="2049518" cy="210207"/>
+          </a:xfrm>
+          <a:prstGeom prst="rect">
+            <a:avLst/>
+          </a:prstGeom>
+          <a:solidFill>
+            <a:schemeClr val="bg1"/>
+          </a:solidFill>
+          <a:ln>
+            <a:noFill/>
+          </a:ln>
+        </p:spPr>
+        <p:style>
+          <a:lnRef idx="2">
+            <a:schemeClr val="accent1">
+              <a:shade val="50000"/>
+            </a:schemeClr>
+          </a:lnRef>
+          <a:fillRef idx="1">
+            <a:schemeClr val="accent1"/>
+          </a:fillRef>
+          <a:effectRef idx="0">
+            <a:schemeClr val="accent1"/>
+          </a:effectRef>
+          <a:fontRef idx="minor">
+            <a:schemeClr val="lt1"/>
+          </a:fontRef>
+        </p:style>
+        <p:txBody>
+          <a:bodyPr rtlCol="0" anchor="ctr"/>
+          <a:lstStyle/>
+          <a:p>
+            <a:pPr algn="ctr"/>
+            <a:endParaRPr lang="en-US"/>
+          </a:p>
+        </p:txBody>
+      </p:sp>
+      <p:sp>
+        <p:nvSpPr>
+          <p:cNvPr id="8" name="Rectangle 7">
+            <a:extLst>
+              <a:ext uri="{FF2B5EF4-FFF2-40B4-BE49-F238E27FC236}">
+                <a16:creationId xmlns:a16="http://schemas.microsoft.com/office/drawing/2014/main" id="{324FCBCA-D74F-C955-ABAB-10F249843B71}"/>
+              </a:ext>
+            </a:extLst>
+          </p:cNvPr>
+          <p:cNvSpPr/>
+          <p:nvPr/>
+        </p:nvSpPr>
+        <p:spPr>
+          <a:xfrm>
+            <a:off x="6647793" y="4377558"/>
+            <a:ext cx="2049518" cy="210207"/>
+          </a:xfrm>
+          <a:prstGeom prst="rect">
+            <a:avLst/>
+          </a:prstGeom>
+          <a:solidFill>
+            <a:schemeClr val="bg1"/>
+          </a:solidFill>
+          <a:ln>
+            <a:noFill/>
+          </a:ln>
+        </p:spPr>
+        <p:style>
+          <a:lnRef idx="2">
+            <a:schemeClr val="accent1">
+              <a:shade val="50000"/>
+            </a:schemeClr>
+          </a:lnRef>
+          <a:fillRef idx="1">
+            <a:schemeClr val="accent1"/>
+          </a:fillRef>
+          <a:effectRef idx="0">
+            <a:schemeClr val="accent1"/>
+          </a:effectRef>
+          <a:fontRef idx="minor">
+            <a:schemeClr val="lt1"/>
+          </a:fontRef>
+        </p:style>
+        <p:txBody>
+          <a:bodyPr rtlCol="0" anchor="ctr"/>
+          <a:lstStyle/>
+          <a:p>
+            <a:pPr algn="ctr"/>
+            <a:r>
+              <a:rPr lang="en-US" dirty="0"/>
+              <a:t>v</a:t>
+            </a:r>
+          </a:p>
+        </p:txBody>
+      </p:sp>
+      <p:sp>
+        <p:nvSpPr>
+          <p:cNvPr id="9" name="Rectangle 8">
+            <a:extLst>
+              <a:ext uri="{FF2B5EF4-FFF2-40B4-BE49-F238E27FC236}">
+                <a16:creationId xmlns:a16="http://schemas.microsoft.com/office/drawing/2014/main" id="{7CA72A5D-2C23-5671-3128-81AB8C87AF87}"/>
+              </a:ext>
+            </a:extLst>
+          </p:cNvPr>
+          <p:cNvSpPr/>
+          <p:nvPr/>
+        </p:nvSpPr>
+        <p:spPr>
+          <a:xfrm>
+            <a:off x="6127531" y="2180896"/>
+            <a:ext cx="2049518" cy="210207"/>
+          </a:xfrm>
+          <a:prstGeom prst="rect">
+            <a:avLst/>
+          </a:prstGeom>
+          <a:solidFill>
+            <a:schemeClr val="bg1"/>
+          </a:solidFill>
+          <a:ln>
+            <a:noFill/>
+          </a:ln>
+        </p:spPr>
+        <p:style>
+          <a:lnRef idx="2">
+            <a:schemeClr val="accent1">
+              <a:shade val="50000"/>
+            </a:schemeClr>
+          </a:lnRef>
+          <a:fillRef idx="1">
+            <a:schemeClr val="accent1"/>
+          </a:fillRef>
+          <a:effectRef idx="0">
+            <a:schemeClr val="accent1"/>
+          </a:effectRef>
+          <a:fontRef idx="minor">
+            <a:schemeClr val="lt1"/>
+          </a:fontRef>
+        </p:style>
+        <p:txBody>
+          <a:bodyPr rtlCol="0" anchor="ctr"/>
+          <a:lstStyle/>
+          <a:p>
+            <a:pPr algn="ctr"/>
+            <a:endParaRPr lang="en-US"/>
+          </a:p>
+        </p:txBody>
+      </p:sp>
+      <p:pic>
+        <p:nvPicPr>
+          <p:cNvPr id="10" name="Picture 9">
+            <a:extLst>
+              <a:ext uri="{FF2B5EF4-FFF2-40B4-BE49-F238E27FC236}">
+                <a16:creationId xmlns:a16="http://schemas.microsoft.com/office/drawing/2014/main" id="{C028B277-52BE-CD6F-7CD6-4D767D3BB6E5}"/>
+              </a:ext>
+            </a:extLst>
+          </p:cNvPr>
+          <p:cNvPicPr>
+            <a:picLocks noChangeAspect="1"/>
+          </p:cNvPicPr>
+          <p:nvPr/>
+        </p:nvPicPr>
+        <p:blipFill>
+          <a:blip r:embed="rId3"/>
+          <a:stretch>
+            <a:fillRect/>
+          </a:stretch>
+        </p:blipFill>
+        <p:spPr>
+          <a:xfrm>
+            <a:off x="6127531" y="2137059"/>
+            <a:ext cx="1902372" cy="297880"/>
+          </a:xfrm>
+          <a:prstGeom prst="rect">
+            <a:avLst/>
+          </a:prstGeom>
+        </p:spPr>
+      </p:pic>
+      <p:pic>
+        <p:nvPicPr>
+          <p:cNvPr id="11" name="Picture 10">
+            <a:extLst>
+              <a:ext uri="{FF2B5EF4-FFF2-40B4-BE49-F238E27FC236}">
+                <a16:creationId xmlns:a16="http://schemas.microsoft.com/office/drawing/2014/main" id="{0C34985F-AA23-2E77-3033-EAD076D245FB}"/>
+              </a:ext>
+            </a:extLst>
+          </p:cNvPr>
+          <p:cNvPicPr>
+            <a:picLocks noChangeAspect="1"/>
+          </p:cNvPicPr>
+          <p:nvPr/>
+        </p:nvPicPr>
+        <p:blipFill>
+          <a:blip r:embed="rId4"/>
+          <a:stretch>
+            <a:fillRect/>
+          </a:stretch>
+        </p:blipFill>
+        <p:spPr>
+          <a:xfrm>
+            <a:off x="5084492" y="4971392"/>
+            <a:ext cx="310742" cy="210208"/>
+          </a:xfrm>
+          <a:prstGeom prst="rect">
+            <a:avLst/>
+          </a:prstGeom>
+        </p:spPr>
+      </p:pic>
+    </p:spTree>
+    <p:extLst>
+      <p:ext uri="{BB962C8B-B14F-4D97-AF65-F5344CB8AC3E}">
+        <p14:creationId xmlns:p14="http://schemas.microsoft.com/office/powerpoint/2010/main" val="1517495630"/>
+      </p:ext>
+    </p:extLst>
+  </p:cSld>
+  <p:clrMapOvr>
+    <a:masterClrMapping/>
+  </p:clrMapOvr>
+</p:sld>
+</file>
+
+<file path=ppt/slides/slide16.xml><?xml version="1.0" encoding="utf-8"?>
+<p:sld xmlns:a="http://schemas.openxmlformats.org/drawingml/2006/main" xmlns:r="http://schemas.openxmlformats.org/officeDocument/2006/relationships" xmlns:p="http://schemas.openxmlformats.org/presentationml/2006/main">
+  <p:cSld>
+    <p:spTree>
+      <p:nvGrpSpPr>
+        <p:cNvPr id="1" name=""/>
+        <p:cNvGrpSpPr/>
+        <p:nvPr/>
+      </p:nvGrpSpPr>
+      <p:grpSpPr>
+        <a:xfrm>
+          <a:off x="0" y="0"/>
+          <a:ext cx="0" cy="0"/>
+          <a:chOff x="0" y="0"/>
+          <a:chExt cx="0" cy="0"/>
+        </a:xfrm>
+      </p:grpSpPr>
+      <p:pic>
+        <p:nvPicPr>
           <p:cNvPr id="4" name="Picture 3">
             <a:extLst>
               <a:ext uri="{FF2B5EF4-FFF2-40B4-BE49-F238E27FC236}">
@@ -5375,8 +6412,8 @@
           </a:p>
         </p:txBody>
       </p:sp>
-      <mc:AlternateContent xmlns:mc="http://schemas.openxmlformats.org/markup-compatibility/2006">
-        <mc:Choice xmlns:a14="http://schemas.microsoft.com/office/drawing/2010/main" Requires="a14">
+      <mc:AlternateContent xmlns:mc="http://schemas.openxmlformats.org/markup-compatibility/2006" xmlns:a14="http://schemas.microsoft.com/office/drawing/2010/main">
+        <mc:Choice Requires="a14">
           <p:sp>
             <p:nvSpPr>
               <p:cNvPr id="6" name="TextBox 5">
@@ -5470,7 +6507,7 @@
             </p:txBody>
           </p:sp>
         </mc:Choice>
-        <mc:Fallback>
+        <mc:Fallback xmlns="">
           <p:sp>
             <p:nvSpPr>
               <p:cNvPr id="6" name="TextBox 5">
@@ -5616,7 +6653,7 @@
 </p:sld>
 </file>
 
-<file path=ppt/slides/slide16.xml><?xml version="1.0" encoding="utf-8"?>
+<file path=ppt/slides/slide17.xml><?xml version="1.0" encoding="utf-8"?>
 <p:sld xmlns:a="http://schemas.openxmlformats.org/drawingml/2006/main" xmlns:r="http://schemas.openxmlformats.org/officeDocument/2006/relationships" xmlns:p="http://schemas.openxmlformats.org/presentationml/2006/main">
   <p:cSld>
     <p:spTree>
@@ -5726,7 +6763,7 @@
 </p:sld>
 </file>
 
-<file path=ppt/slides/slide17.xml><?xml version="1.0" encoding="utf-8"?>
+<file path=ppt/slides/slide18.xml><?xml version="1.0" encoding="utf-8"?>
 <p:sld xmlns:a="http://schemas.openxmlformats.org/drawingml/2006/main" xmlns:r="http://schemas.openxmlformats.org/officeDocument/2006/relationships" xmlns:p="http://schemas.openxmlformats.org/presentationml/2006/main">
   <p:cSld>
     <p:spTree>
@@ -5861,6 +6898,385 @@
           </a:p>
         </p:txBody>
       </p:sp>
+      <p:pic>
+        <p:nvPicPr>
+          <p:cNvPr id="3" name="Picture 2">
+            <a:extLst>
+              <a:ext uri="{FF2B5EF4-FFF2-40B4-BE49-F238E27FC236}">
+                <a16:creationId xmlns:a16="http://schemas.microsoft.com/office/drawing/2014/main" id="{D91627DC-F661-B58D-83CF-AED34E9DD35B}"/>
+              </a:ext>
+            </a:extLst>
+          </p:cNvPr>
+          <p:cNvPicPr>
+            <a:picLocks noChangeAspect="1"/>
+          </p:cNvPicPr>
+          <p:nvPr/>
+        </p:nvPicPr>
+        <p:blipFill>
+          <a:blip r:embed="rId2"/>
+          <a:stretch>
+            <a:fillRect/>
+          </a:stretch>
+        </p:blipFill>
+        <p:spPr>
+          <a:xfrm>
+            <a:off x="336922" y="3587855"/>
+            <a:ext cx="5087200" cy="3206164"/>
+          </a:xfrm>
+          <a:prstGeom prst="rect">
+            <a:avLst/>
+          </a:prstGeom>
+        </p:spPr>
+      </p:pic>
+      <p:sp>
+        <p:nvSpPr>
+          <p:cNvPr id="6" name="Freeform 5">
+            <a:extLst>
+              <a:ext uri="{FF2B5EF4-FFF2-40B4-BE49-F238E27FC236}">
+                <a16:creationId xmlns:a16="http://schemas.microsoft.com/office/drawing/2014/main" id="{1796E697-5ADC-1946-00FF-7E90AEB786C3}"/>
+              </a:ext>
+            </a:extLst>
+          </p:cNvPr>
+          <p:cNvSpPr/>
+          <p:nvPr/>
+        </p:nvSpPr>
+        <p:spPr>
+          <a:xfrm>
+            <a:off x="1622162" y="4045055"/>
+            <a:ext cx="2753360" cy="1889760"/>
+          </a:xfrm>
+          <a:custGeom>
+            <a:avLst/>
+            <a:gdLst>
+              <a:gd name="connsiteX0" fmla="*/ 0 w 2753360"/>
+              <a:gd name="connsiteY0" fmla="*/ 0 h 1889760"/>
+              <a:gd name="connsiteX1" fmla="*/ 2753360 w 2753360"/>
+              <a:gd name="connsiteY1" fmla="*/ 1889760 h 1889760"/>
+              <a:gd name="connsiteX0" fmla="*/ 0 w 2753360"/>
+              <a:gd name="connsiteY0" fmla="*/ 0 h 1889760"/>
+              <a:gd name="connsiteX1" fmla="*/ 2753360 w 2753360"/>
+              <a:gd name="connsiteY1" fmla="*/ 1889760 h 1889760"/>
+              <a:gd name="connsiteX0" fmla="*/ 0 w 2753360"/>
+              <a:gd name="connsiteY0" fmla="*/ 0 h 1889760"/>
+              <a:gd name="connsiteX1" fmla="*/ 2753360 w 2753360"/>
+              <a:gd name="connsiteY1" fmla="*/ 1889760 h 1889760"/>
+            </a:gdLst>
+            <a:ahLst/>
+            <a:cxnLst>
+              <a:cxn ang="0">
+                <a:pos x="connsiteX0" y="connsiteY0"/>
+              </a:cxn>
+              <a:cxn ang="0">
+                <a:pos x="connsiteX1" y="connsiteY1"/>
+              </a:cxn>
+            </a:cxnLst>
+            <a:rect l="l" t="t" r="r" b="b"/>
+            <a:pathLst>
+              <a:path w="2753360" h="1889760">
+                <a:moveTo>
+                  <a:pt x="0" y="0"/>
+                </a:moveTo>
+                <a:cubicBezTo>
+                  <a:pt x="676487" y="1206500"/>
+                  <a:pt x="1495214" y="1651000"/>
+                  <a:pt x="2753360" y="1889760"/>
+                </a:cubicBezTo>
+              </a:path>
+            </a:pathLst>
+          </a:custGeom>
+          <a:noFill/>
+          <a:ln w="63500">
+            <a:solidFill>
+              <a:schemeClr val="accent6"/>
+            </a:solidFill>
+          </a:ln>
+        </p:spPr>
+        <p:style>
+          <a:lnRef idx="2">
+            <a:schemeClr val="accent1">
+              <a:shade val="50000"/>
+            </a:schemeClr>
+          </a:lnRef>
+          <a:fillRef idx="1">
+            <a:schemeClr val="accent1"/>
+          </a:fillRef>
+          <a:effectRef idx="0">
+            <a:schemeClr val="accent1"/>
+          </a:effectRef>
+          <a:fontRef idx="minor">
+            <a:schemeClr val="lt1"/>
+          </a:fontRef>
+        </p:style>
+        <p:txBody>
+          <a:bodyPr rtlCol="0" anchor="ctr"/>
+          <a:lstStyle/>
+          <a:p>
+            <a:pPr algn="ctr"/>
+            <a:endParaRPr lang="en-US"/>
+          </a:p>
+        </p:txBody>
+      </p:sp>
+      <p:pic>
+        <p:nvPicPr>
+          <p:cNvPr id="7" name="Picture 6">
+            <a:extLst>
+              <a:ext uri="{FF2B5EF4-FFF2-40B4-BE49-F238E27FC236}">
+                <a16:creationId xmlns:a16="http://schemas.microsoft.com/office/drawing/2014/main" id="{E0ECC878-AF3A-A3E0-0EFE-1FEFB6B68910}"/>
+              </a:ext>
+            </a:extLst>
+          </p:cNvPr>
+          <p:cNvPicPr>
+            <a:picLocks noChangeAspect="1"/>
+          </p:cNvPicPr>
+          <p:nvPr/>
+        </p:nvPicPr>
+        <p:blipFill>
+          <a:blip r:embed="rId2"/>
+          <a:stretch>
+            <a:fillRect/>
+          </a:stretch>
+        </p:blipFill>
+        <p:spPr>
+          <a:xfrm>
+            <a:off x="6527246" y="3509596"/>
+            <a:ext cx="5087200" cy="3206164"/>
+          </a:xfrm>
+          <a:prstGeom prst="rect">
+            <a:avLst/>
+          </a:prstGeom>
+        </p:spPr>
+      </p:pic>
+      <p:sp>
+        <p:nvSpPr>
+          <p:cNvPr id="10" name="Freeform 9">
+            <a:extLst>
+              <a:ext uri="{FF2B5EF4-FFF2-40B4-BE49-F238E27FC236}">
+                <a16:creationId xmlns:a16="http://schemas.microsoft.com/office/drawing/2014/main" id="{66328178-1B61-3CE9-16BD-687945DC2001}"/>
+              </a:ext>
+            </a:extLst>
+          </p:cNvPr>
+          <p:cNvSpPr/>
+          <p:nvPr/>
+        </p:nvSpPr>
+        <p:spPr>
+          <a:xfrm>
+            <a:off x="7750175" y="4038600"/>
+            <a:ext cx="215900" cy="1111250"/>
+          </a:xfrm>
+          <a:custGeom>
+            <a:avLst/>
+            <a:gdLst>
+              <a:gd name="connsiteX0" fmla="*/ 0 w 215900"/>
+              <a:gd name="connsiteY0" fmla="*/ 1111250 h 1111250"/>
+              <a:gd name="connsiteX1" fmla="*/ 25400 w 215900"/>
+              <a:gd name="connsiteY1" fmla="*/ 660400 h 1111250"/>
+              <a:gd name="connsiteX2" fmla="*/ 31750 w 215900"/>
+              <a:gd name="connsiteY2" fmla="*/ 457200 h 1111250"/>
+              <a:gd name="connsiteX3" fmla="*/ 60325 w 215900"/>
+              <a:gd name="connsiteY3" fmla="*/ 733425 h 1111250"/>
+              <a:gd name="connsiteX4" fmla="*/ 66675 w 215900"/>
+              <a:gd name="connsiteY4" fmla="*/ 511175 h 1111250"/>
+              <a:gd name="connsiteX5" fmla="*/ 85725 w 215900"/>
+              <a:gd name="connsiteY5" fmla="*/ 657225 h 1111250"/>
+              <a:gd name="connsiteX6" fmla="*/ 92075 w 215900"/>
+              <a:gd name="connsiteY6" fmla="*/ 422275 h 1111250"/>
+              <a:gd name="connsiteX7" fmla="*/ 111125 w 215900"/>
+              <a:gd name="connsiteY7" fmla="*/ 225425 h 1111250"/>
+              <a:gd name="connsiteX8" fmla="*/ 136525 w 215900"/>
+              <a:gd name="connsiteY8" fmla="*/ 603250 h 1111250"/>
+              <a:gd name="connsiteX9" fmla="*/ 152400 w 215900"/>
+              <a:gd name="connsiteY9" fmla="*/ 0 h 1111250"/>
+              <a:gd name="connsiteX10" fmla="*/ 168275 w 215900"/>
+              <a:gd name="connsiteY10" fmla="*/ 219075 h 1111250"/>
+              <a:gd name="connsiteX11" fmla="*/ 168275 w 215900"/>
+              <a:gd name="connsiteY11" fmla="*/ 733425 h 1111250"/>
+              <a:gd name="connsiteX12" fmla="*/ 180975 w 215900"/>
+              <a:gd name="connsiteY12" fmla="*/ 171450 h 1111250"/>
+              <a:gd name="connsiteX13" fmla="*/ 184150 w 215900"/>
+              <a:gd name="connsiteY13" fmla="*/ 244475 h 1111250"/>
+              <a:gd name="connsiteX14" fmla="*/ 206375 w 215900"/>
+              <a:gd name="connsiteY14" fmla="*/ 660400 h 1111250"/>
+              <a:gd name="connsiteX15" fmla="*/ 215900 w 215900"/>
+              <a:gd name="connsiteY15" fmla="*/ 400050 h 1111250"/>
+            </a:gdLst>
+            <a:ahLst/>
+            <a:cxnLst>
+              <a:cxn ang="0">
+                <a:pos x="connsiteX0" y="connsiteY0"/>
+              </a:cxn>
+              <a:cxn ang="0">
+                <a:pos x="connsiteX1" y="connsiteY1"/>
+              </a:cxn>
+              <a:cxn ang="0">
+                <a:pos x="connsiteX2" y="connsiteY2"/>
+              </a:cxn>
+              <a:cxn ang="0">
+                <a:pos x="connsiteX3" y="connsiteY3"/>
+              </a:cxn>
+              <a:cxn ang="0">
+                <a:pos x="connsiteX4" y="connsiteY4"/>
+              </a:cxn>
+              <a:cxn ang="0">
+                <a:pos x="connsiteX5" y="connsiteY5"/>
+              </a:cxn>
+              <a:cxn ang="0">
+                <a:pos x="connsiteX6" y="connsiteY6"/>
+              </a:cxn>
+              <a:cxn ang="0">
+                <a:pos x="connsiteX7" y="connsiteY7"/>
+              </a:cxn>
+              <a:cxn ang="0">
+                <a:pos x="connsiteX8" y="connsiteY8"/>
+              </a:cxn>
+              <a:cxn ang="0">
+                <a:pos x="connsiteX9" y="connsiteY9"/>
+              </a:cxn>
+              <a:cxn ang="0">
+                <a:pos x="connsiteX10" y="connsiteY10"/>
+              </a:cxn>
+              <a:cxn ang="0">
+                <a:pos x="connsiteX11" y="connsiteY11"/>
+              </a:cxn>
+              <a:cxn ang="0">
+                <a:pos x="connsiteX12" y="connsiteY12"/>
+              </a:cxn>
+              <a:cxn ang="0">
+                <a:pos x="connsiteX13" y="connsiteY13"/>
+              </a:cxn>
+              <a:cxn ang="0">
+                <a:pos x="connsiteX14" y="connsiteY14"/>
+              </a:cxn>
+              <a:cxn ang="0">
+                <a:pos x="connsiteX15" y="connsiteY15"/>
+              </a:cxn>
+            </a:cxnLst>
+            <a:rect l="l" t="t" r="r" b="b"/>
+            <a:pathLst>
+              <a:path w="215900" h="1111250">
+                <a:moveTo>
+                  <a:pt x="0" y="1111250"/>
+                </a:moveTo>
+                <a:lnTo>
+                  <a:pt x="25400" y="660400"/>
+                </a:lnTo>
+                <a:lnTo>
+                  <a:pt x="31750" y="457200"/>
+                </a:lnTo>
+                <a:lnTo>
+                  <a:pt x="60325" y="733425"/>
+                </a:lnTo>
+                <a:lnTo>
+                  <a:pt x="66675" y="511175"/>
+                </a:lnTo>
+                <a:lnTo>
+                  <a:pt x="85725" y="657225"/>
+                </a:lnTo>
+                <a:lnTo>
+                  <a:pt x="92075" y="422275"/>
+                </a:lnTo>
+                <a:lnTo>
+                  <a:pt x="111125" y="225425"/>
+                </a:lnTo>
+                <a:lnTo>
+                  <a:pt x="136525" y="603250"/>
+                </a:lnTo>
+                <a:lnTo>
+                  <a:pt x="152400" y="0"/>
+                </a:lnTo>
+                <a:lnTo>
+                  <a:pt x="168275" y="219075"/>
+                </a:lnTo>
+                <a:lnTo>
+                  <a:pt x="168275" y="733425"/>
+                </a:lnTo>
+                <a:lnTo>
+                  <a:pt x="180975" y="171450"/>
+                </a:lnTo>
+                <a:lnTo>
+                  <a:pt x="184150" y="244475"/>
+                </a:lnTo>
+                <a:lnTo>
+                  <a:pt x="206375" y="660400"/>
+                </a:lnTo>
+                <a:lnTo>
+                  <a:pt x="215900" y="400050"/>
+                </a:lnTo>
+              </a:path>
+            </a:pathLst>
+          </a:custGeom>
+          <a:noFill/>
+          <a:ln>
+            <a:solidFill>
+              <a:schemeClr val="accent6"/>
+            </a:solidFill>
+          </a:ln>
+        </p:spPr>
+        <p:style>
+          <a:lnRef idx="2">
+            <a:schemeClr val="accent1">
+              <a:shade val="50000"/>
+            </a:schemeClr>
+          </a:lnRef>
+          <a:fillRef idx="1">
+            <a:schemeClr val="accent1"/>
+          </a:fillRef>
+          <a:effectRef idx="0">
+            <a:schemeClr val="accent1"/>
+          </a:effectRef>
+          <a:fontRef idx="minor">
+            <a:schemeClr val="lt1"/>
+          </a:fontRef>
+        </p:style>
+        <p:txBody>
+          <a:bodyPr rtlCol="0" anchor="ctr"/>
+          <a:lstStyle/>
+          <a:p>
+            <a:pPr algn="ctr"/>
+            <a:endParaRPr lang="en-US"/>
+          </a:p>
+        </p:txBody>
+      </p:sp>
+      <p:sp>
+        <p:nvSpPr>
+          <p:cNvPr id="11" name="TextBox 10">
+            <a:extLst>
+              <a:ext uri="{FF2B5EF4-FFF2-40B4-BE49-F238E27FC236}">
+                <a16:creationId xmlns:a16="http://schemas.microsoft.com/office/drawing/2014/main" id="{E07850FB-1305-33AE-992C-F03C5683FE90}"/>
+              </a:ext>
+            </a:extLst>
+          </p:cNvPr>
+          <p:cNvSpPr txBox="1"/>
+          <p:nvPr/>
+        </p:nvSpPr>
+        <p:spPr>
+          <a:xfrm>
+            <a:off x="8695745" y="4167743"/>
+            <a:ext cx="1544012" cy="369332"/>
+          </a:xfrm>
+          <a:prstGeom prst="rect">
+            <a:avLst/>
+          </a:prstGeom>
+          <a:noFill/>
+        </p:spPr>
+        <p:txBody>
+          <a:bodyPr wrap="none" rtlCol="0">
+            <a:spAutoFit/>
+          </a:bodyPr>
+          <a:lstStyle/>
+          <a:p>
+            <a:r>
+              <a:rPr lang="en-US" b="1" dirty="0">
+                <a:solidFill>
+                  <a:schemeClr val="accent6"/>
+                </a:solidFill>
+                <a:latin typeface="Arial" panose="020B0604020202020204" pitchFamily="34" charset="0"/>
+                <a:cs typeface="Arial" panose="020B0604020202020204" pitchFamily="34" charset="0"/>
+              </a:rPr>
+              <a:t>And so on…</a:t>
+            </a:r>
+          </a:p>
+        </p:txBody>
+      </p:sp>
     </p:spTree>
     <p:extLst>
       <p:ext uri="{BB962C8B-B14F-4D97-AF65-F5344CB8AC3E}">
@@ -5874,7 +7290,7 @@
 </p:sld>
 </file>
 
-<file path=ppt/slides/slide18.xml><?xml version="1.0" encoding="utf-8"?>
+<file path=ppt/slides/slide19.xml><?xml version="1.0" encoding="utf-8"?>
 <p:sld xmlns:a="http://schemas.openxmlformats.org/drawingml/2006/main" xmlns:r="http://schemas.openxmlformats.org/officeDocument/2006/relationships" xmlns:p="http://schemas.openxmlformats.org/presentationml/2006/main">
   <p:cSld>
     <p:spTree>
@@ -7836,6 +9252,143 @@
       </p:par>
     </p:tnLst>
   </p:timing>
+</p:sld>
+</file>
+
+<file path=ppt/slides/slide20.xml><?xml version="1.0" encoding="utf-8"?>
+<p:sld xmlns:a="http://schemas.openxmlformats.org/drawingml/2006/main" xmlns:r="http://schemas.openxmlformats.org/officeDocument/2006/relationships" xmlns:p="http://schemas.openxmlformats.org/presentationml/2006/main">
+  <p:cSld>
+    <p:spTree>
+      <p:nvGrpSpPr>
+        <p:cNvPr id="1" name=""/>
+        <p:cNvGrpSpPr/>
+        <p:nvPr/>
+      </p:nvGrpSpPr>
+      <p:grpSpPr>
+        <a:xfrm>
+          <a:off x="0" y="0"/>
+          <a:ext cx="0" cy="0"/>
+          <a:chOff x="0" y="0"/>
+          <a:chExt cx="0" cy="0"/>
+        </a:xfrm>
+      </p:grpSpPr>
+      <p:pic>
+        <p:nvPicPr>
+          <p:cNvPr id="1026" name="Picture 2">
+            <a:extLst>
+              <a:ext uri="{FF2B5EF4-FFF2-40B4-BE49-F238E27FC236}">
+                <a16:creationId xmlns:a16="http://schemas.microsoft.com/office/drawing/2014/main" id="{9466344C-EF66-BA4E-204B-B3E595075450}"/>
+              </a:ext>
+            </a:extLst>
+          </p:cNvPr>
+          <p:cNvPicPr>
+            <a:picLocks noChangeAspect="1" noChangeArrowheads="1"/>
+          </p:cNvPicPr>
+          <p:nvPr/>
+        </p:nvPicPr>
+        <p:blipFill>
+          <a:blip r:embed="rId2">
+            <a:extLst>
+              <a:ext uri="{28A0092B-C50C-407E-A947-70E740481C1C}">
+                <a14:useLocalDpi xmlns:a14="http://schemas.microsoft.com/office/drawing/2010/main" val="0"/>
+              </a:ext>
+            </a:extLst>
+          </a:blip>
+          <a:srcRect/>
+          <a:stretch>
+            <a:fillRect/>
+          </a:stretch>
+        </p:blipFill>
+        <p:spPr bwMode="auto">
+          <a:xfrm>
+            <a:off x="2581442" y="2296313"/>
+            <a:ext cx="6795367" cy="2006170"/>
+          </a:xfrm>
+          <a:prstGeom prst="rect">
+            <a:avLst/>
+          </a:prstGeom>
+          <a:noFill/>
+          <a:extLst>
+            <a:ext uri="{909E8E84-426E-40DD-AFC4-6F175D3DCCD1}">
+              <a14:hiddenFill xmlns:a14="http://schemas.microsoft.com/office/drawing/2010/main">
+                <a:solidFill>
+                  <a:srgbClr val="FFFFFF"/>
+                </a:solidFill>
+              </a14:hiddenFill>
+            </a:ext>
+          </a:extLst>
+        </p:spPr>
+      </p:pic>
+    </p:spTree>
+    <p:extLst>
+      <p:ext uri="{BB962C8B-B14F-4D97-AF65-F5344CB8AC3E}">
+        <p14:creationId xmlns:p14="http://schemas.microsoft.com/office/powerpoint/2010/main" val="1821256650"/>
+      </p:ext>
+    </p:extLst>
+  </p:cSld>
+  <p:clrMapOvr>
+    <a:masterClrMapping/>
+  </p:clrMapOvr>
+</p:sld>
+</file>
+
+<file path=ppt/slides/slide21.xml><?xml version="1.0" encoding="utf-8"?>
+<p:sld xmlns:a="http://schemas.openxmlformats.org/drawingml/2006/main" xmlns:r="http://schemas.openxmlformats.org/officeDocument/2006/relationships" xmlns:p="http://schemas.openxmlformats.org/presentationml/2006/main">
+  <p:cSld>
+    <p:spTree>
+      <p:nvGrpSpPr>
+        <p:cNvPr id="1" name=""/>
+        <p:cNvGrpSpPr/>
+        <p:nvPr/>
+      </p:nvGrpSpPr>
+      <p:grpSpPr>
+        <a:xfrm>
+          <a:off x="0" y="0"/>
+          <a:ext cx="0" cy="0"/>
+          <a:chOff x="0" y="0"/>
+          <a:chExt cx="0" cy="0"/>
+        </a:xfrm>
+      </p:grpSpPr>
+      <p:pic>
+        <p:nvPicPr>
+          <p:cNvPr id="4" name="Picture 3">
+            <a:extLst>
+              <a:ext uri="{FF2B5EF4-FFF2-40B4-BE49-F238E27FC236}">
+                <a16:creationId xmlns:a16="http://schemas.microsoft.com/office/drawing/2014/main" id="{6B6200F6-325D-DC63-3A51-8FBCDDCC072D}"/>
+              </a:ext>
+            </a:extLst>
+          </p:cNvPr>
+          <p:cNvPicPr>
+            <a:picLocks noChangeAspect="1"/>
+          </p:cNvPicPr>
+          <p:nvPr/>
+        </p:nvPicPr>
+        <p:blipFill>
+          <a:blip r:embed="rId2"/>
+          <a:stretch>
+            <a:fillRect/>
+          </a:stretch>
+        </p:blipFill>
+        <p:spPr>
+          <a:xfrm>
+            <a:off x="2952750" y="1788865"/>
+            <a:ext cx="5309507" cy="3560050"/>
+          </a:xfrm>
+          <a:prstGeom prst="rect">
+            <a:avLst/>
+          </a:prstGeom>
+        </p:spPr>
+      </p:pic>
+    </p:spTree>
+    <p:extLst>
+      <p:ext uri="{BB962C8B-B14F-4D97-AF65-F5344CB8AC3E}">
+        <p14:creationId xmlns:p14="http://schemas.microsoft.com/office/powerpoint/2010/main" val="4249144499"/>
+      </p:ext>
+    </p:extLst>
+  </p:cSld>
+  <p:clrMapOvr>
+    <a:masterClrMapping/>
+  </p:clrMapOvr>
 </p:sld>
 </file>
 

</xml_diff>

<commit_message>
drafted the massive notebook
</commit_message>
<xml_diff>
--- a/dsmcer_2023_update/Lecture_Notebooks/L4-6_visual_support.pptx
+++ b/dsmcer_2023_update/Lecture_Notebooks/L4-6_visual_support.pptx
@@ -26,6 +26,7 @@
     <p:sldId id="274" r:id="rId20"/>
     <p:sldId id="276" r:id="rId21"/>
     <p:sldId id="277" r:id="rId22"/>
+    <p:sldId id="278" r:id="rId23"/>
   </p:sldIdLst>
   <p:sldSz cx="12192000" cy="6858000"/>
   <p:notesSz cx="6858000" cy="9144000"/>
@@ -279,7 +280,7 @@
           <a:p>
             <a:fld id="{B9CDD8D7-AFDD-9749-90F5-2CC70159DE98}" type="datetimeFigureOut">
               <a:rPr lang="en-US" smtClean="0"/>
-              <a:t>12/22/22</a:t>
+              <a:t>12/27/22</a:t>
             </a:fld>
             <a:endParaRPr lang="en-US"/>
           </a:p>
@@ -477,7 +478,7 @@
           <a:p>
             <a:fld id="{B9CDD8D7-AFDD-9749-90F5-2CC70159DE98}" type="datetimeFigureOut">
               <a:rPr lang="en-US" smtClean="0"/>
-              <a:t>12/22/22</a:t>
+              <a:t>12/27/22</a:t>
             </a:fld>
             <a:endParaRPr lang="en-US"/>
           </a:p>
@@ -685,7 +686,7 @@
           <a:p>
             <a:fld id="{B9CDD8D7-AFDD-9749-90F5-2CC70159DE98}" type="datetimeFigureOut">
               <a:rPr lang="en-US" smtClean="0"/>
-              <a:t>12/22/22</a:t>
+              <a:t>12/27/22</a:t>
             </a:fld>
             <a:endParaRPr lang="en-US"/>
           </a:p>
@@ -883,7 +884,7 @@
           <a:p>
             <a:fld id="{B9CDD8D7-AFDD-9749-90F5-2CC70159DE98}" type="datetimeFigureOut">
               <a:rPr lang="en-US" smtClean="0"/>
-              <a:t>12/22/22</a:t>
+              <a:t>12/27/22</a:t>
             </a:fld>
             <a:endParaRPr lang="en-US"/>
           </a:p>
@@ -1158,7 +1159,7 @@
           <a:p>
             <a:fld id="{B9CDD8D7-AFDD-9749-90F5-2CC70159DE98}" type="datetimeFigureOut">
               <a:rPr lang="en-US" smtClean="0"/>
-              <a:t>12/22/22</a:t>
+              <a:t>12/27/22</a:t>
             </a:fld>
             <a:endParaRPr lang="en-US"/>
           </a:p>
@@ -1423,7 +1424,7 @@
           <a:p>
             <a:fld id="{B9CDD8D7-AFDD-9749-90F5-2CC70159DE98}" type="datetimeFigureOut">
               <a:rPr lang="en-US" smtClean="0"/>
-              <a:t>12/22/22</a:t>
+              <a:t>12/27/22</a:t>
             </a:fld>
             <a:endParaRPr lang="en-US"/>
           </a:p>
@@ -1835,7 +1836,7 @@
           <a:p>
             <a:fld id="{B9CDD8D7-AFDD-9749-90F5-2CC70159DE98}" type="datetimeFigureOut">
               <a:rPr lang="en-US" smtClean="0"/>
-              <a:t>12/22/22</a:t>
+              <a:t>12/27/22</a:t>
             </a:fld>
             <a:endParaRPr lang="en-US"/>
           </a:p>
@@ -1976,7 +1977,7 @@
           <a:p>
             <a:fld id="{B9CDD8D7-AFDD-9749-90F5-2CC70159DE98}" type="datetimeFigureOut">
               <a:rPr lang="en-US" smtClean="0"/>
-              <a:t>12/22/22</a:t>
+              <a:t>12/27/22</a:t>
             </a:fld>
             <a:endParaRPr lang="en-US"/>
           </a:p>
@@ -2089,7 +2090,7 @@
           <a:p>
             <a:fld id="{B9CDD8D7-AFDD-9749-90F5-2CC70159DE98}" type="datetimeFigureOut">
               <a:rPr lang="en-US" smtClean="0"/>
-              <a:t>12/22/22</a:t>
+              <a:t>12/27/22</a:t>
             </a:fld>
             <a:endParaRPr lang="en-US"/>
           </a:p>
@@ -2400,7 +2401,7 @@
           <a:p>
             <a:fld id="{B9CDD8D7-AFDD-9749-90F5-2CC70159DE98}" type="datetimeFigureOut">
               <a:rPr lang="en-US" smtClean="0"/>
-              <a:t>12/22/22</a:t>
+              <a:t>12/27/22</a:t>
             </a:fld>
             <a:endParaRPr lang="en-US"/>
           </a:p>
@@ -2688,7 +2689,7 @@
           <a:p>
             <a:fld id="{B9CDD8D7-AFDD-9749-90F5-2CC70159DE98}" type="datetimeFigureOut">
               <a:rPr lang="en-US" smtClean="0"/>
-              <a:t>12/22/22</a:t>
+              <a:t>12/27/22</a:t>
             </a:fld>
             <a:endParaRPr lang="en-US"/>
           </a:p>
@@ -2929,7 +2930,7 @@
           <a:p>
             <a:fld id="{B9CDD8D7-AFDD-9749-90F5-2CC70159DE98}" type="datetimeFigureOut">
               <a:rPr lang="en-US" smtClean="0"/>
-              <a:t>12/22/22</a:t>
+              <a:t>12/27/22</a:t>
             </a:fld>
             <a:endParaRPr lang="en-US"/>
           </a:p>
@@ -6359,8 +6360,8 @@
         </p:blipFill>
         <p:spPr>
           <a:xfrm>
-            <a:off x="2509267" y="2648864"/>
-            <a:ext cx="7262727" cy="467193"/>
+            <a:off x="2509267" y="2664182"/>
+            <a:ext cx="7262727" cy="436557"/>
           </a:xfrm>
           <a:prstGeom prst="rect">
             <a:avLst/>
@@ -9383,6 +9384,349 @@
     <p:extLst>
       <p:ext uri="{BB962C8B-B14F-4D97-AF65-F5344CB8AC3E}">
         <p14:creationId xmlns:p14="http://schemas.microsoft.com/office/powerpoint/2010/main" val="4249144499"/>
+      </p:ext>
+    </p:extLst>
+  </p:cSld>
+  <p:clrMapOvr>
+    <a:masterClrMapping/>
+  </p:clrMapOvr>
+</p:sld>
+</file>
+
+<file path=ppt/slides/slide22.xml><?xml version="1.0" encoding="utf-8"?>
+<p:sld xmlns:a="http://schemas.openxmlformats.org/drawingml/2006/main" xmlns:r="http://schemas.openxmlformats.org/officeDocument/2006/relationships" xmlns:p="http://schemas.openxmlformats.org/presentationml/2006/main">
+  <p:cSld>
+    <p:spTree>
+      <p:nvGrpSpPr>
+        <p:cNvPr id="1" name=""/>
+        <p:cNvGrpSpPr/>
+        <p:nvPr/>
+      </p:nvGrpSpPr>
+      <p:grpSpPr>
+        <a:xfrm>
+          <a:off x="0" y="0"/>
+          <a:ext cx="0" cy="0"/>
+          <a:chOff x="0" y="0"/>
+          <a:chExt cx="0" cy="0"/>
+        </a:xfrm>
+      </p:grpSpPr>
+      <p:pic>
+        <p:nvPicPr>
+          <p:cNvPr id="4" name="Picture 3">
+            <a:extLst>
+              <a:ext uri="{FF2B5EF4-FFF2-40B4-BE49-F238E27FC236}">
+                <a16:creationId xmlns:a16="http://schemas.microsoft.com/office/drawing/2014/main" id="{993BCC91-1C2D-4744-A07E-F4E27FCF7BBF}"/>
+              </a:ext>
+            </a:extLst>
+          </p:cNvPr>
+          <p:cNvPicPr>
+            <a:picLocks noChangeAspect="1"/>
+          </p:cNvPicPr>
+          <p:nvPr/>
+        </p:nvPicPr>
+        <p:blipFill>
+          <a:blip r:embed="rId2"/>
+          <a:stretch>
+            <a:fillRect/>
+          </a:stretch>
+        </p:blipFill>
+        <p:spPr>
+          <a:xfrm>
+            <a:off x="3696972" y="1140265"/>
+            <a:ext cx="4521200" cy="520700"/>
+          </a:xfrm>
+          <a:prstGeom prst="rect">
+            <a:avLst/>
+          </a:prstGeom>
+        </p:spPr>
+      </p:pic>
+      <p:sp>
+        <p:nvSpPr>
+          <p:cNvPr id="5" name="TextBox 4">
+            <a:extLst>
+              <a:ext uri="{FF2B5EF4-FFF2-40B4-BE49-F238E27FC236}">
+                <a16:creationId xmlns:a16="http://schemas.microsoft.com/office/drawing/2014/main" id="{7B104E49-2AB7-33C4-FB24-497E16C1068A}"/>
+              </a:ext>
+            </a:extLst>
+          </p:cNvPr>
+          <p:cNvSpPr txBox="1"/>
+          <p:nvPr/>
+        </p:nvSpPr>
+        <p:spPr>
+          <a:xfrm>
+            <a:off x="3868699" y="146873"/>
+            <a:ext cx="4177747" cy="707886"/>
+          </a:xfrm>
+          <a:prstGeom prst="rect">
+            <a:avLst/>
+          </a:prstGeom>
+          <a:noFill/>
+        </p:spPr>
+        <p:txBody>
+          <a:bodyPr wrap="none" rtlCol="0">
+            <a:spAutoFit/>
+          </a:bodyPr>
+          <a:lstStyle/>
+          <a:p>
+            <a:r>
+              <a:rPr lang="en-US" sz="4000" dirty="0">
+                <a:latin typeface="Arial" panose="020B0604020202020204" pitchFamily="34" charset="0"/>
+                <a:cs typeface="Arial" panose="020B0604020202020204" pitchFamily="34" charset="0"/>
+              </a:rPr>
+              <a:t>L2 Regularization</a:t>
+            </a:r>
+          </a:p>
+        </p:txBody>
+      </p:sp>
+      <p:sp>
+        <p:nvSpPr>
+          <p:cNvPr id="6" name="Left Brace 5">
+            <a:extLst>
+              <a:ext uri="{FF2B5EF4-FFF2-40B4-BE49-F238E27FC236}">
+                <a16:creationId xmlns:a16="http://schemas.microsoft.com/office/drawing/2014/main" id="{785FC3D7-8EC0-8BD2-95DD-039154D1D520}"/>
+              </a:ext>
+            </a:extLst>
+          </p:cNvPr>
+          <p:cNvSpPr/>
+          <p:nvPr/>
+        </p:nvSpPr>
+        <p:spPr>
+          <a:xfrm rot="16200000">
+            <a:off x="5641270" y="1342463"/>
+            <a:ext cx="357352" cy="1208013"/>
+          </a:xfrm>
+          <a:prstGeom prst="leftBrace">
+            <a:avLst/>
+          </a:prstGeom>
+          <a:ln w="22225"/>
+        </p:spPr>
+        <p:style>
+          <a:lnRef idx="1">
+            <a:schemeClr val="accent1"/>
+          </a:lnRef>
+          <a:fillRef idx="0">
+            <a:schemeClr val="accent1"/>
+          </a:fillRef>
+          <a:effectRef idx="0">
+            <a:schemeClr val="accent1"/>
+          </a:effectRef>
+          <a:fontRef idx="minor">
+            <a:schemeClr val="tx1"/>
+          </a:fontRef>
+        </p:style>
+        <p:txBody>
+          <a:bodyPr rtlCol="0" anchor="ctr"/>
+          <a:lstStyle/>
+          <a:p>
+            <a:pPr algn="ctr"/>
+            <a:endParaRPr lang="en-US"/>
+          </a:p>
+        </p:txBody>
+      </p:sp>
+      <p:sp>
+        <p:nvSpPr>
+          <p:cNvPr id="7" name="TextBox 6">
+            <a:extLst>
+              <a:ext uri="{FF2B5EF4-FFF2-40B4-BE49-F238E27FC236}">
+                <a16:creationId xmlns:a16="http://schemas.microsoft.com/office/drawing/2014/main" id="{AD5D5433-1888-3FC1-C3B7-9727057D0D39}"/>
+              </a:ext>
+            </a:extLst>
+          </p:cNvPr>
+          <p:cNvSpPr txBox="1"/>
+          <p:nvPr/>
+        </p:nvSpPr>
+        <p:spPr>
+          <a:xfrm>
+            <a:off x="4251275" y="2125146"/>
+            <a:ext cx="3137341" cy="369332"/>
+          </a:xfrm>
+          <a:prstGeom prst="rect">
+            <a:avLst/>
+          </a:prstGeom>
+          <a:noFill/>
+        </p:spPr>
+        <p:txBody>
+          <a:bodyPr wrap="square" rtlCol="0">
+            <a:spAutoFit/>
+          </a:bodyPr>
+          <a:lstStyle/>
+          <a:p>
+            <a:pPr algn="ctr"/>
+            <a:r>
+              <a:rPr lang="en-US" b="1" dirty="0">
+                <a:latin typeface="Arial" panose="020B0604020202020204" pitchFamily="34" charset="0"/>
+                <a:cs typeface="Arial" panose="020B0604020202020204" pitchFamily="34" charset="0"/>
+              </a:rPr>
+              <a:t>Error on data.</a:t>
+            </a:r>
+            <a:endParaRPr lang="en-US" dirty="0">
+              <a:latin typeface="Arial" panose="020B0604020202020204" pitchFamily="34" charset="0"/>
+              <a:cs typeface="Arial" panose="020B0604020202020204" pitchFamily="34" charset="0"/>
+            </a:endParaRPr>
+          </a:p>
+        </p:txBody>
+      </p:sp>
+      <mc:AlternateContent xmlns:mc="http://schemas.openxmlformats.org/markup-compatibility/2006">
+        <mc:Choice xmlns:a14="http://schemas.microsoft.com/office/drawing/2010/main" Requires="a14">
+          <p:sp>
+            <p:nvSpPr>
+              <p:cNvPr id="8" name="TextBox 7">
+                <a:extLst>
+                  <a:ext uri="{FF2B5EF4-FFF2-40B4-BE49-F238E27FC236}">
+                    <a16:creationId xmlns:a16="http://schemas.microsoft.com/office/drawing/2014/main" id="{3F5DD0C3-488A-9BE9-F20A-9AFB48139429}"/>
+                  </a:ext>
+                </a:extLst>
+              </p:cNvPr>
+              <p:cNvSpPr txBox="1"/>
+              <p:nvPr/>
+            </p:nvSpPr>
+            <p:spPr>
+              <a:xfrm>
+                <a:off x="6741955" y="2171312"/>
+                <a:ext cx="2772435" cy="923330"/>
+              </a:xfrm>
+              <a:prstGeom prst="rect">
+                <a:avLst/>
+              </a:prstGeom>
+              <a:noFill/>
+            </p:spPr>
+            <p:txBody>
+              <a:bodyPr wrap="square" rtlCol="0">
+                <a:spAutoFit/>
+              </a:bodyPr>
+              <a:lstStyle/>
+              <a:p>
+                <a:pPr algn="ctr"/>
+                <a:r>
+                  <a:rPr lang="en-US" b="1" dirty="0">
+                    <a:latin typeface="Arial" panose="020B0604020202020204" pitchFamily="34" charset="0"/>
+                    <a:cs typeface="Arial" panose="020B0604020202020204" pitchFamily="34" charset="0"/>
+                  </a:rPr>
+                  <a:t>Caution</a:t>
+                </a:r>
+                <a:r>
+                  <a:rPr lang="en-US" dirty="0">
+                    <a:latin typeface="Arial" panose="020B0604020202020204" pitchFamily="34" charset="0"/>
+                    <a:cs typeface="Arial" panose="020B0604020202020204" pitchFamily="34" charset="0"/>
+                  </a:rPr>
+                  <a:t> on model parameters. </a:t>
+                </a:r>
+                <a14:m>
+                  <m:oMath xmlns:m="http://schemas.openxmlformats.org/officeDocument/2006/math">
+                    <m:r>
+                      <a:rPr lang="en-US" b="0" i="1" smtClean="0">
+                        <a:latin typeface="Cambria Math" panose="02040503050406030204" pitchFamily="18" charset="0"/>
+                        <a:cs typeface="Arial" panose="020B0604020202020204" pitchFamily="34" charset="0"/>
+                      </a:rPr>
+                      <m:t>𝜆</m:t>
+                    </m:r>
+                  </m:oMath>
+                </a14:m>
+                <a:r>
+                  <a:rPr lang="en-US" dirty="0">
+                    <a:latin typeface="Arial" panose="020B0604020202020204" pitchFamily="34" charset="0"/>
+                    <a:cs typeface="Arial" panose="020B0604020202020204" pitchFamily="34" charset="0"/>
+                  </a:rPr>
+                  <a:t> is hyperparameter</a:t>
+                </a:r>
+              </a:p>
+            </p:txBody>
+          </p:sp>
+        </mc:Choice>
+        <mc:Fallback>
+          <p:sp>
+            <p:nvSpPr>
+              <p:cNvPr id="8" name="TextBox 7">
+                <a:extLst>
+                  <a:ext uri="{FF2B5EF4-FFF2-40B4-BE49-F238E27FC236}">
+                    <a16:creationId xmlns:a16="http://schemas.microsoft.com/office/drawing/2014/main" id="{3F5DD0C3-488A-9BE9-F20A-9AFB48139429}"/>
+                  </a:ext>
+                </a:extLst>
+              </p:cNvPr>
+              <p:cNvSpPr txBox="1">
+                <a:spLocks noRot="1" noChangeAspect="1" noMove="1" noResize="1" noEditPoints="1" noAdjustHandles="1" noChangeArrowheads="1" noChangeShapeType="1" noTextEdit="1"/>
+              </p:cNvSpPr>
+              <p:nvPr/>
+            </p:nvSpPr>
+            <p:spPr>
+              <a:xfrm>
+                <a:off x="6741955" y="2171312"/>
+                <a:ext cx="2772435" cy="923330"/>
+              </a:xfrm>
+              <a:prstGeom prst="rect">
+                <a:avLst/>
+              </a:prstGeom>
+              <a:blipFill>
+                <a:blip r:embed="rId3"/>
+                <a:stretch>
+                  <a:fillRect t="-2703" b="-10811"/>
+                </a:stretch>
+              </a:blipFill>
+            </p:spPr>
+            <p:txBody>
+              <a:bodyPr/>
+              <a:lstStyle/>
+              <a:p>
+                <a:r>
+                  <a:rPr lang="en-US">
+                    <a:noFill/>
+                  </a:rPr>
+                  <a:t> </a:t>
+                </a:r>
+              </a:p>
+            </p:txBody>
+          </p:sp>
+        </mc:Fallback>
+      </mc:AlternateContent>
+      <p:sp>
+        <p:nvSpPr>
+          <p:cNvPr id="9" name="Left Brace 8">
+            <a:extLst>
+              <a:ext uri="{FF2B5EF4-FFF2-40B4-BE49-F238E27FC236}">
+                <a16:creationId xmlns:a16="http://schemas.microsoft.com/office/drawing/2014/main" id="{1216B079-2BAC-9321-2006-4436177FCD90}"/>
+              </a:ext>
+            </a:extLst>
+          </p:cNvPr>
+          <p:cNvSpPr/>
+          <p:nvPr/>
+        </p:nvSpPr>
+        <p:spPr>
+          <a:xfrm rot="16200000">
+            <a:off x="7471286" y="1212907"/>
+            <a:ext cx="357352" cy="1321328"/>
+          </a:xfrm>
+          <a:prstGeom prst="leftBrace">
+            <a:avLst/>
+          </a:prstGeom>
+          <a:ln w="22225"/>
+        </p:spPr>
+        <p:style>
+          <a:lnRef idx="1">
+            <a:schemeClr val="accent1"/>
+          </a:lnRef>
+          <a:fillRef idx="0">
+            <a:schemeClr val="accent1"/>
+          </a:fillRef>
+          <a:effectRef idx="0">
+            <a:schemeClr val="accent1"/>
+          </a:effectRef>
+          <a:fontRef idx="minor">
+            <a:schemeClr val="tx1"/>
+          </a:fontRef>
+        </p:style>
+        <p:txBody>
+          <a:bodyPr rtlCol="0" anchor="ctr"/>
+          <a:lstStyle/>
+          <a:p>
+            <a:pPr algn="ctr"/>
+            <a:endParaRPr lang="en-US"/>
+          </a:p>
+        </p:txBody>
+      </p:sp>
+    </p:spTree>
+    <p:extLst>
+      <p:ext uri="{BB962C8B-B14F-4D97-AF65-F5344CB8AC3E}">
+        <p14:creationId xmlns:p14="http://schemas.microsoft.com/office/powerpoint/2010/main" val="2735350959"/>
       </p:ext>
     </p:extLst>
   </p:cSld>

</xml_diff>